<commit_message>
Clean up, making things nicer, still one NAMD figure left to be  improved
</commit_message>
<xml_diff>
--- a/executionModelandBenefits.pptx
+++ b/executionModelandBenefits.pptx
@@ -5,10 +5,10 @@
     <p:sldMasterId id="2147483733" r:id="rId1"/>
   </p:sldMasterIdLst>
   <p:notesMasterIdLst>
-    <p:notesMasterId r:id="rId17"/>
+    <p:notesMasterId r:id="rId18"/>
   </p:notesMasterIdLst>
   <p:handoutMasterIdLst>
-    <p:handoutMasterId r:id="rId18"/>
+    <p:handoutMasterId r:id="rId19"/>
   </p:handoutMasterIdLst>
   <p:sldIdLst>
     <p:sldId id="859" r:id="rId2"/>
@@ -21,11 +21,12 @@
     <p:sldId id="867" r:id="rId9"/>
     <p:sldId id="868" r:id="rId10"/>
     <p:sldId id="869" r:id="rId11"/>
-    <p:sldId id="870" r:id="rId12"/>
-    <p:sldId id="872" r:id="rId13"/>
-    <p:sldId id="871" r:id="rId14"/>
-    <p:sldId id="873" r:id="rId15"/>
-    <p:sldId id="874" r:id="rId16"/>
+    <p:sldId id="875" r:id="rId12"/>
+    <p:sldId id="870" r:id="rId13"/>
+    <p:sldId id="872" r:id="rId14"/>
+    <p:sldId id="871" r:id="rId15"/>
+    <p:sldId id="873" r:id="rId16"/>
+    <p:sldId id="874" r:id="rId17"/>
   </p:sldIdLst>
   <p:sldSz cx="9144000" cy="6858000" type="screen4x3"/>
   <p:notesSz cx="6858000" cy="9144000"/>
@@ -239,7 +240,7 @@
           <a:p>
             <a:fld id="{74504F5D-E38D-3641-802A-EEE0508E3D0C}" type="datetimeFigureOut">
               <a:rPr lang="en-US" smtClean="0"/>
-              <a:t>9/15/12</a:t>
+              <a:t>11/9/12</a:t>
             </a:fld>
             <a:endParaRPr lang="en-US"/>
           </a:p>
@@ -1200,7 +1201,7 @@
             <a:fld id="{74EE1C46-5B6B-4637-A2A1-BAEA4C622F53}" type="slidenum">
               <a:rPr lang="en-US" smtClean="0"/>
               <a:pPr/>
-              <a:t>11</a:t>
+              <a:t>12</a:t>
             </a:fld>
             <a:endParaRPr lang="en-US" smtClean="0"/>
           </a:p>
@@ -1292,7 +1293,7 @@
             <a:fld id="{74EE1C46-5B6B-4637-A2A1-BAEA4C622F53}" type="slidenum">
               <a:rPr lang="en-US" smtClean="0"/>
               <a:pPr/>
-              <a:t>12</a:t>
+              <a:t>13</a:t>
             </a:fld>
             <a:endParaRPr lang="en-US" smtClean="0"/>
           </a:p>
@@ -1384,7 +1385,7 @@
             <a:fld id="{AF61AFBA-2533-4D53-9FC5-FB020C8F9006}" type="slidenum">
               <a:rPr lang="en-US" smtClean="0"/>
               <a:pPr/>
-              <a:t>13</a:t>
+              <a:t>14</a:t>
             </a:fld>
             <a:endParaRPr lang="en-US" smtClean="0"/>
           </a:p>
@@ -1480,7 +1481,7 @@
             <a:fld id="{CB468D0F-5633-42A7-B3BC-36CE79F89F6E}" type="slidenum">
               <a:rPr lang="en-US" smtClean="0"/>
               <a:pPr/>
-              <a:t>14</a:t>
+              <a:t>15</a:t>
             </a:fld>
             <a:endParaRPr lang="en-US" smtClean="0"/>
           </a:p>
@@ -1518,7 +1519,7 @@
             <a:fld id="{C23DDD33-B2E2-4149-80B0-1BD161528359}" type="slidenum">
               <a:rPr lang="en-US" sz="1200"/>
               <a:pPr algn="r"/>
-              <a:t>14</a:t>
+              <a:t>15</a:t>
             </a:fld>
             <a:endParaRPr lang="en-US" sz="1200"/>
           </a:p>
@@ -1856,7 +1857,7 @@
             </a:pPr>
             <a:fld id="{AA0571AE-C5F6-8141-96D7-3EF140AB39EF}" type="datetime1">
               <a:rPr lang="en-US" smtClean="0"/>
-              <a:t>9/15/12</a:t>
+              <a:t>11/9/12</a:t>
             </a:fld>
             <a:endParaRPr lang="en-US" dirty="0"/>
           </a:p>
@@ -2047,7 +2048,7 @@
             </a:pPr>
             <a:fld id="{0FCB74E0-8675-8A41-AF55-47A9C3E618EC}" type="datetime1">
               <a:rPr lang="en-US" smtClean="0"/>
-              <a:t>9/15/12</a:t>
+              <a:t>11/9/12</a:t>
             </a:fld>
             <a:endParaRPr lang="en-US" dirty="0"/>
           </a:p>
@@ -2312,7 +2313,7 @@
             </a:pPr>
             <a:fld id="{B9B838B9-B83A-2742-B81E-2224FF492CB7}" type="datetime1">
               <a:rPr lang="en-US" smtClean="0"/>
-              <a:t>9/15/12</a:t>
+              <a:t>11/9/12</a:t>
             </a:fld>
             <a:endParaRPr lang="en-US" dirty="0"/>
           </a:p>
@@ -2515,7 +2516,7 @@
             </a:pPr>
             <a:fld id="{6EB91310-9395-5143-B1BA-A237D729344F}" type="datetime1">
               <a:rPr lang="en-US" smtClean="0"/>
-              <a:t>9/15/12</a:t>
+              <a:t>11/9/12</a:t>
             </a:fld>
             <a:endParaRPr lang="en-US" dirty="0"/>
           </a:p>
@@ -2654,7 +2655,7 @@
             </a:pPr>
             <a:fld id="{171ED8FD-22AC-D048-80E5-7B008B567DD0}" type="datetime1">
               <a:rPr lang="en-US" smtClean="0"/>
-              <a:t>9/15/12</a:t>
+              <a:t>11/9/12</a:t>
             </a:fld>
             <a:endParaRPr lang="en-US" dirty="0"/>
           </a:p>
@@ -2845,7 +2846,7 @@
             </a:pPr>
             <a:fld id="{7C8A7FED-BB5C-A549-B9BD-FA431724F549}" type="datetime1">
               <a:rPr lang="en-US" smtClean="0"/>
-              <a:t>9/15/12</a:t>
+              <a:t>11/9/12</a:t>
             </a:fld>
             <a:endParaRPr lang="en-US" dirty="0"/>
           </a:p>
@@ -3112,7 +3113,7 @@
             </a:pPr>
             <a:fld id="{5A04DB1B-FB82-E64D-9CEE-426EBE0463F0}" type="datetime1">
               <a:rPr lang="en-US" smtClean="0"/>
-              <a:t>9/15/12</a:t>
+              <a:t>11/9/12</a:t>
             </a:fld>
             <a:endParaRPr lang="en-US" dirty="0"/>
           </a:p>
@@ -3421,7 +3422,7 @@
             </a:pPr>
             <a:fld id="{29BB98FC-E41A-824F-9F78-4AE13AF52D71}" type="datetime1">
               <a:rPr lang="en-US" smtClean="0"/>
-              <a:t>9/15/12</a:t>
+              <a:t>11/9/12</a:t>
             </a:fld>
             <a:endParaRPr lang="en-US" dirty="0"/>
           </a:p>
@@ -3864,7 +3865,7 @@
             </a:pPr>
             <a:fld id="{90C9C97B-1B9C-B442-9F91-965D4F73F1FD}" type="datetime1">
               <a:rPr lang="en-US" smtClean="0"/>
-              <a:t>9/15/12</a:t>
+              <a:t>11/9/12</a:t>
             </a:fld>
             <a:endParaRPr lang="en-US" dirty="0"/>
           </a:p>
@@ -4003,7 +4004,7 @@
             </a:pPr>
             <a:fld id="{5592F02B-3414-D84B-A312-CF464CA9A6D5}" type="datetime1">
               <a:rPr lang="en-US" smtClean="0"/>
-              <a:t>9/15/12</a:t>
+              <a:t>11/9/12</a:t>
             </a:fld>
             <a:endParaRPr lang="en-US" dirty="0"/>
           </a:p>
@@ -4119,7 +4120,7 @@
             </a:pPr>
             <a:fld id="{4EC95F61-6518-524A-8455-ED3254B189DC}" type="datetime1">
               <a:rPr lang="en-US" smtClean="0"/>
-              <a:t>9/15/12</a:t>
+              <a:t>11/9/12</a:t>
             </a:fld>
             <a:endParaRPr lang="en-US" dirty="0"/>
           </a:p>
@@ -4417,7 +4418,7 @@
             </a:pPr>
             <a:fld id="{CF65ADCC-52F7-4B42-8E22-D7F2B680056F}" type="datetime1">
               <a:rPr lang="en-US" smtClean="0"/>
-              <a:t>9/15/12</a:t>
+              <a:t>11/9/12</a:t>
             </a:fld>
             <a:endParaRPr lang="en-US" dirty="0"/>
           </a:p>
@@ -4699,7 +4700,7 @@
             </a:pPr>
             <a:fld id="{59FCE8E1-FE63-1745-8712-E70F409A094C}" type="datetime1">
               <a:rPr lang="en-US" smtClean="0"/>
-              <a:t>9/15/12</a:t>
+              <a:t>11/9/12</a:t>
             </a:fld>
             <a:endParaRPr lang="en-US" dirty="0"/>
           </a:p>
@@ -4999,7 +5000,7 @@
             </a:pPr>
             <a:fld id="{4194C403-D6CC-B84C-8178-563F8821496E}" type="datetime1">
               <a:rPr lang="en-US" smtClean="0"/>
-              <a:t>9/15/12</a:t>
+              <a:t>11/9/12</a:t>
             </a:fld>
             <a:endParaRPr lang="en-US" dirty="0"/>
           </a:p>
@@ -5600,7 +5601,7 @@
             </a:pPr>
             <a:fld id="{403BFB5A-0E5A-B14F-BA2C-C992A038A8A2}" type="datetime1">
               <a:rPr lang="en-US" smtClean="0"/>
-              <a:t>9/15/12</a:t>
+              <a:t>11/9/12</a:t>
             </a:fld>
             <a:endParaRPr lang="en-US" dirty="0"/>
           </a:p>
@@ -5942,7 +5943,7 @@
           <a:p>
             <a:fld id="{5E38CCD5-DB2B-784E-B911-C8F1C819B36D}" type="datetime1">
               <a:rPr lang="en-US" smtClean="0"/>
-              <a:t>9/15/12</a:t>
+              <a:t>11/9/12</a:t>
             </a:fld>
             <a:endParaRPr lang="en-US" dirty="0"/>
           </a:p>
@@ -7647,6 +7648,1768 @@
       </p:grpSpPr>
       <p:sp>
         <p:nvSpPr>
+          <p:cNvPr id="2" name="Date Placeholder 1"/>
+          <p:cNvSpPr>
+            <a:spLocks noGrp="1"/>
+          </p:cNvSpPr>
+          <p:nvPr>
+            <p:ph type="dt" sz="half" idx="10"/>
+          </p:nvPr>
+        </p:nvSpPr>
+        <p:spPr/>
+        <p:txBody>
+          <a:bodyPr/>
+          <a:lstStyle/>
+          <a:p>
+            <a:pPr>
+              <a:defRPr/>
+            </a:pPr>
+            <a:fld id="{4EC95F61-6518-524A-8455-ED3254B189DC}" type="datetime1">
+              <a:rPr lang="en-US" smtClean="0"/>
+              <a:t>11/9/12</a:t>
+            </a:fld>
+            <a:endParaRPr lang="en-US" dirty="0"/>
+          </a:p>
+        </p:txBody>
+      </p:sp>
+      <p:sp>
+        <p:nvSpPr>
+          <p:cNvPr id="3" name="Footer Placeholder 2"/>
+          <p:cNvSpPr>
+            <a:spLocks noGrp="1"/>
+          </p:cNvSpPr>
+          <p:nvPr>
+            <p:ph type="ftr" sz="quarter" idx="11"/>
+          </p:nvPr>
+        </p:nvSpPr>
+        <p:spPr/>
+        <p:txBody>
+          <a:bodyPr/>
+          <a:lstStyle/>
+          <a:p>
+            <a:pPr>
+              <a:defRPr/>
+            </a:pPr>
+            <a:r>
+              <a:rPr lang="en-US" smtClean="0"/>
+              <a:t>LBNL/LLNL</a:t>
+            </a:r>
+            <a:endParaRPr lang="en-US" dirty="0"/>
+          </a:p>
+        </p:txBody>
+      </p:sp>
+      <p:sp>
+        <p:nvSpPr>
+          <p:cNvPr id="4" name="Slide Number Placeholder 3"/>
+          <p:cNvSpPr>
+            <a:spLocks noGrp="1"/>
+          </p:cNvSpPr>
+          <p:nvPr>
+            <p:ph type="sldNum" sz="quarter" idx="12"/>
+          </p:nvPr>
+        </p:nvSpPr>
+        <p:spPr/>
+        <p:txBody>
+          <a:bodyPr/>
+          <a:lstStyle/>
+          <a:p>
+            <a:pPr>
+              <a:defRPr/>
+            </a:pPr>
+            <a:fld id="{BFFC72E0-3E7F-4709-B8DF-5EC8A0346E37}" type="slidenum">
+              <a:rPr lang="en-US" smtClean="0"/>
+              <a:pPr>
+                <a:defRPr/>
+              </a:pPr>
+              <a:t>11</a:t>
+            </a:fld>
+            <a:endParaRPr lang="en-US" dirty="0"/>
+          </a:p>
+        </p:txBody>
+      </p:sp>
+      <p:sp>
+        <p:nvSpPr>
+          <p:cNvPr id="5" name="Rectangle 4"/>
+          <p:cNvSpPr/>
+          <p:nvPr/>
+        </p:nvSpPr>
+        <p:spPr>
+          <a:xfrm>
+            <a:off x="3505200" y="4248090"/>
+            <a:ext cx="4343400" cy="381000"/>
+          </a:xfrm>
+          <a:prstGeom prst="rect">
+            <a:avLst/>
+          </a:prstGeom>
+          <a:solidFill>
+            <a:schemeClr val="accent6">
+              <a:lumMod val="20000"/>
+              <a:lumOff val="80000"/>
+            </a:schemeClr>
+          </a:solidFill>
+          <a:ln>
+            <a:solidFill>
+              <a:schemeClr val="accent6">
+                <a:lumMod val="60000"/>
+                <a:lumOff val="40000"/>
+              </a:schemeClr>
+            </a:solidFill>
+          </a:ln>
+        </p:spPr>
+        <p:style>
+          <a:lnRef idx="2">
+            <a:schemeClr val="accent1">
+              <a:shade val="50000"/>
+            </a:schemeClr>
+          </a:lnRef>
+          <a:fillRef idx="1">
+            <a:schemeClr val="accent1"/>
+          </a:fillRef>
+          <a:effectRef idx="0">
+            <a:schemeClr val="accent1"/>
+          </a:effectRef>
+          <a:fontRef idx="minor">
+            <a:schemeClr val="lt1"/>
+          </a:fontRef>
+        </p:style>
+        <p:txBody>
+          <a:bodyPr anchor="ctr"/>
+          <a:lstStyle/>
+          <a:p>
+            <a:pPr algn="ctr">
+              <a:defRPr/>
+            </a:pPr>
+            <a:endParaRPr lang="en-US" dirty="0"/>
+          </a:p>
+        </p:txBody>
+      </p:sp>
+      <p:sp>
+        <p:nvSpPr>
+          <p:cNvPr id="6" name="Rectangle 5"/>
+          <p:cNvSpPr/>
+          <p:nvPr/>
+        </p:nvSpPr>
+        <p:spPr>
+          <a:xfrm>
+            <a:off x="3505200" y="3562290"/>
+            <a:ext cx="4343400" cy="381000"/>
+          </a:xfrm>
+          <a:prstGeom prst="rect">
+            <a:avLst/>
+          </a:prstGeom>
+          <a:solidFill>
+            <a:schemeClr val="accent6">
+              <a:lumMod val="20000"/>
+              <a:lumOff val="80000"/>
+            </a:schemeClr>
+          </a:solidFill>
+          <a:ln>
+            <a:solidFill>
+              <a:schemeClr val="accent6">
+                <a:lumMod val="60000"/>
+                <a:lumOff val="40000"/>
+              </a:schemeClr>
+            </a:solidFill>
+          </a:ln>
+        </p:spPr>
+        <p:style>
+          <a:lnRef idx="2">
+            <a:schemeClr val="accent1">
+              <a:shade val="50000"/>
+            </a:schemeClr>
+          </a:lnRef>
+          <a:fillRef idx="1">
+            <a:schemeClr val="accent1"/>
+          </a:fillRef>
+          <a:effectRef idx="0">
+            <a:schemeClr val="accent1"/>
+          </a:effectRef>
+          <a:fontRef idx="minor">
+            <a:schemeClr val="lt1"/>
+          </a:fontRef>
+        </p:style>
+        <p:txBody>
+          <a:bodyPr anchor="ctr"/>
+          <a:lstStyle/>
+          <a:p>
+            <a:pPr algn="ctr">
+              <a:defRPr/>
+            </a:pPr>
+            <a:endParaRPr lang="en-US" dirty="0"/>
+          </a:p>
+        </p:txBody>
+      </p:sp>
+      <p:sp>
+        <p:nvSpPr>
+          <p:cNvPr id="7" name="Rectangle 6"/>
+          <p:cNvSpPr/>
+          <p:nvPr/>
+        </p:nvSpPr>
+        <p:spPr>
+          <a:xfrm>
+            <a:off x="3429000" y="2419290"/>
+            <a:ext cx="4343400" cy="381000"/>
+          </a:xfrm>
+          <a:prstGeom prst="rect">
+            <a:avLst/>
+          </a:prstGeom>
+          <a:solidFill>
+            <a:schemeClr val="accent6">
+              <a:lumMod val="20000"/>
+              <a:lumOff val="80000"/>
+            </a:schemeClr>
+          </a:solidFill>
+          <a:ln>
+            <a:solidFill>
+              <a:schemeClr val="accent6">
+                <a:lumMod val="60000"/>
+                <a:lumOff val="40000"/>
+              </a:schemeClr>
+            </a:solidFill>
+          </a:ln>
+        </p:spPr>
+        <p:style>
+          <a:lnRef idx="2">
+            <a:schemeClr val="accent1">
+              <a:shade val="50000"/>
+            </a:schemeClr>
+          </a:lnRef>
+          <a:fillRef idx="1">
+            <a:schemeClr val="accent1"/>
+          </a:fillRef>
+          <a:effectRef idx="0">
+            <a:schemeClr val="accent1"/>
+          </a:effectRef>
+          <a:fontRef idx="minor">
+            <a:schemeClr val="lt1"/>
+          </a:fontRef>
+        </p:style>
+        <p:txBody>
+          <a:bodyPr anchor="ctr"/>
+          <a:lstStyle/>
+          <a:p>
+            <a:pPr algn="ctr">
+              <a:defRPr/>
+            </a:pPr>
+            <a:endParaRPr lang="en-US" dirty="0"/>
+          </a:p>
+        </p:txBody>
+      </p:sp>
+      <p:sp>
+        <p:nvSpPr>
+          <p:cNvPr id="8" name="Rectangle 7"/>
+          <p:cNvSpPr/>
+          <p:nvPr/>
+        </p:nvSpPr>
+        <p:spPr>
+          <a:xfrm>
+            <a:off x="3505200" y="3028890"/>
+            <a:ext cx="4343400" cy="381000"/>
+          </a:xfrm>
+          <a:prstGeom prst="rect">
+            <a:avLst/>
+          </a:prstGeom>
+          <a:solidFill>
+            <a:schemeClr val="accent6">
+              <a:lumMod val="20000"/>
+              <a:lumOff val="80000"/>
+            </a:schemeClr>
+          </a:solidFill>
+          <a:ln>
+            <a:solidFill>
+              <a:schemeClr val="accent6">
+                <a:lumMod val="60000"/>
+                <a:lumOff val="40000"/>
+              </a:schemeClr>
+            </a:solidFill>
+          </a:ln>
+        </p:spPr>
+        <p:style>
+          <a:lnRef idx="2">
+            <a:schemeClr val="accent1">
+              <a:shade val="50000"/>
+            </a:schemeClr>
+          </a:lnRef>
+          <a:fillRef idx="1">
+            <a:schemeClr val="accent1"/>
+          </a:fillRef>
+          <a:effectRef idx="0">
+            <a:schemeClr val="accent1"/>
+          </a:effectRef>
+          <a:fontRef idx="minor">
+            <a:schemeClr val="lt1"/>
+          </a:fontRef>
+        </p:style>
+        <p:txBody>
+          <a:bodyPr anchor="ctr"/>
+          <a:lstStyle/>
+          <a:p>
+            <a:pPr algn="ctr">
+              <a:defRPr/>
+            </a:pPr>
+            <a:endParaRPr lang="en-US" dirty="0"/>
+          </a:p>
+        </p:txBody>
+      </p:sp>
+      <p:sp>
+        <p:nvSpPr>
+          <p:cNvPr id="9" name="Rectangle 8"/>
+          <p:cNvSpPr/>
+          <p:nvPr/>
+        </p:nvSpPr>
+        <p:spPr>
+          <a:xfrm>
+            <a:off x="3657600" y="3181290"/>
+            <a:ext cx="76200" cy="76200"/>
+          </a:xfrm>
+          <a:prstGeom prst="rect">
+            <a:avLst/>
+          </a:prstGeom>
+          <a:ln>
+            <a:noFill/>
+          </a:ln>
+        </p:spPr>
+        <p:style>
+          <a:lnRef idx="2">
+            <a:schemeClr val="accent1">
+              <a:shade val="50000"/>
+            </a:schemeClr>
+          </a:lnRef>
+          <a:fillRef idx="1">
+            <a:schemeClr val="accent1"/>
+          </a:fillRef>
+          <a:effectRef idx="0">
+            <a:schemeClr val="accent1"/>
+          </a:effectRef>
+          <a:fontRef idx="minor">
+            <a:schemeClr val="lt1"/>
+          </a:fontRef>
+        </p:style>
+        <p:txBody>
+          <a:bodyPr anchor="ctr"/>
+          <a:lstStyle/>
+          <a:p>
+            <a:pPr algn="ctr">
+              <a:defRPr/>
+            </a:pPr>
+            <a:endParaRPr lang="en-US" dirty="0"/>
+          </a:p>
+        </p:txBody>
+      </p:sp>
+      <p:sp>
+        <p:nvSpPr>
+          <p:cNvPr id="10" name="Rectangle 9"/>
+          <p:cNvSpPr/>
+          <p:nvPr/>
+        </p:nvSpPr>
+        <p:spPr>
+          <a:xfrm>
+            <a:off x="3657600" y="3714690"/>
+            <a:ext cx="76200" cy="76200"/>
+          </a:xfrm>
+          <a:prstGeom prst="rect">
+            <a:avLst/>
+          </a:prstGeom>
+          <a:ln>
+            <a:noFill/>
+          </a:ln>
+        </p:spPr>
+        <p:style>
+          <a:lnRef idx="2">
+            <a:schemeClr val="accent1">
+              <a:shade val="50000"/>
+            </a:schemeClr>
+          </a:lnRef>
+          <a:fillRef idx="1">
+            <a:schemeClr val="accent1"/>
+          </a:fillRef>
+          <a:effectRef idx="0">
+            <a:schemeClr val="accent1"/>
+          </a:effectRef>
+          <a:fontRef idx="minor">
+            <a:schemeClr val="lt1"/>
+          </a:fontRef>
+        </p:style>
+        <p:txBody>
+          <a:bodyPr anchor="ctr"/>
+          <a:lstStyle/>
+          <a:p>
+            <a:pPr algn="ctr">
+              <a:defRPr/>
+            </a:pPr>
+            <a:endParaRPr lang="en-US" dirty="0"/>
+          </a:p>
+        </p:txBody>
+      </p:sp>
+      <p:sp>
+        <p:nvSpPr>
+          <p:cNvPr id="11" name="Rectangle 10"/>
+          <p:cNvSpPr/>
+          <p:nvPr/>
+        </p:nvSpPr>
+        <p:spPr>
+          <a:xfrm>
+            <a:off x="3733800" y="2647890"/>
+            <a:ext cx="76200" cy="76200"/>
+          </a:xfrm>
+          <a:prstGeom prst="rect">
+            <a:avLst/>
+          </a:prstGeom>
+          <a:ln>
+            <a:noFill/>
+          </a:ln>
+        </p:spPr>
+        <p:style>
+          <a:lnRef idx="2">
+            <a:schemeClr val="accent1">
+              <a:shade val="50000"/>
+            </a:schemeClr>
+          </a:lnRef>
+          <a:fillRef idx="1">
+            <a:schemeClr val="accent1"/>
+          </a:fillRef>
+          <a:effectRef idx="0">
+            <a:schemeClr val="accent1"/>
+          </a:effectRef>
+          <a:fontRef idx="minor">
+            <a:schemeClr val="lt1"/>
+          </a:fontRef>
+        </p:style>
+        <p:txBody>
+          <a:bodyPr anchor="ctr"/>
+          <a:lstStyle/>
+          <a:p>
+            <a:pPr algn="ctr">
+              <a:defRPr/>
+            </a:pPr>
+            <a:endParaRPr lang="en-US" dirty="0"/>
+          </a:p>
+        </p:txBody>
+      </p:sp>
+      <p:sp>
+        <p:nvSpPr>
+          <p:cNvPr id="12" name="Rectangle 11"/>
+          <p:cNvSpPr/>
+          <p:nvPr/>
+        </p:nvSpPr>
+        <p:spPr>
+          <a:xfrm>
+            <a:off x="4114800" y="2647890"/>
+            <a:ext cx="76200" cy="76200"/>
+          </a:xfrm>
+          <a:prstGeom prst="rect">
+            <a:avLst/>
+          </a:prstGeom>
+          <a:ln>
+            <a:noFill/>
+          </a:ln>
+        </p:spPr>
+        <p:style>
+          <a:lnRef idx="2">
+            <a:schemeClr val="accent1">
+              <a:shade val="50000"/>
+            </a:schemeClr>
+          </a:lnRef>
+          <a:fillRef idx="1">
+            <a:schemeClr val="accent1"/>
+          </a:fillRef>
+          <a:effectRef idx="0">
+            <a:schemeClr val="accent1"/>
+          </a:effectRef>
+          <a:fontRef idx="minor">
+            <a:schemeClr val="lt1"/>
+          </a:fontRef>
+        </p:style>
+        <p:txBody>
+          <a:bodyPr anchor="ctr"/>
+          <a:lstStyle/>
+          <a:p>
+            <a:pPr algn="ctr">
+              <a:defRPr/>
+            </a:pPr>
+            <a:endParaRPr lang="en-US" dirty="0"/>
+          </a:p>
+        </p:txBody>
+      </p:sp>
+      <p:sp>
+        <p:nvSpPr>
+          <p:cNvPr id="13" name="Rectangle 12"/>
+          <p:cNvSpPr/>
+          <p:nvPr/>
+        </p:nvSpPr>
+        <p:spPr>
+          <a:xfrm>
+            <a:off x="3886200" y="3714690"/>
+            <a:ext cx="76200" cy="76200"/>
+          </a:xfrm>
+          <a:prstGeom prst="rect">
+            <a:avLst/>
+          </a:prstGeom>
+          <a:ln>
+            <a:noFill/>
+          </a:ln>
+        </p:spPr>
+        <p:style>
+          <a:lnRef idx="2">
+            <a:schemeClr val="accent1">
+              <a:shade val="50000"/>
+            </a:schemeClr>
+          </a:lnRef>
+          <a:fillRef idx="1">
+            <a:schemeClr val="accent1"/>
+          </a:fillRef>
+          <a:effectRef idx="0">
+            <a:schemeClr val="accent1"/>
+          </a:effectRef>
+          <a:fontRef idx="minor">
+            <a:schemeClr val="lt1"/>
+          </a:fontRef>
+        </p:style>
+        <p:txBody>
+          <a:bodyPr anchor="ctr"/>
+          <a:lstStyle/>
+          <a:p>
+            <a:pPr algn="ctr">
+              <a:defRPr/>
+            </a:pPr>
+            <a:endParaRPr lang="en-US" dirty="0"/>
+          </a:p>
+        </p:txBody>
+      </p:sp>
+      <p:sp>
+        <p:nvSpPr>
+          <p:cNvPr id="14" name="Rectangle 13"/>
+          <p:cNvSpPr/>
+          <p:nvPr/>
+        </p:nvSpPr>
+        <p:spPr>
+          <a:xfrm>
+            <a:off x="3962400" y="4400490"/>
+            <a:ext cx="76200" cy="76200"/>
+          </a:xfrm>
+          <a:prstGeom prst="rect">
+            <a:avLst/>
+          </a:prstGeom>
+          <a:ln>
+            <a:noFill/>
+          </a:ln>
+        </p:spPr>
+        <p:style>
+          <a:lnRef idx="2">
+            <a:schemeClr val="accent1">
+              <a:shade val="50000"/>
+            </a:schemeClr>
+          </a:lnRef>
+          <a:fillRef idx="1">
+            <a:schemeClr val="accent1"/>
+          </a:fillRef>
+          <a:effectRef idx="0">
+            <a:schemeClr val="accent1"/>
+          </a:effectRef>
+          <a:fontRef idx="minor">
+            <a:schemeClr val="lt1"/>
+          </a:fontRef>
+        </p:style>
+        <p:txBody>
+          <a:bodyPr anchor="ctr"/>
+          <a:lstStyle/>
+          <a:p>
+            <a:pPr algn="ctr">
+              <a:defRPr/>
+            </a:pPr>
+            <a:endParaRPr lang="en-US" dirty="0"/>
+          </a:p>
+        </p:txBody>
+      </p:sp>
+      <p:sp>
+        <p:nvSpPr>
+          <p:cNvPr id="15" name="Rectangle 14"/>
+          <p:cNvSpPr/>
+          <p:nvPr/>
+        </p:nvSpPr>
+        <p:spPr>
+          <a:xfrm>
+            <a:off x="4191000" y="4400490"/>
+            <a:ext cx="76200" cy="76200"/>
+          </a:xfrm>
+          <a:prstGeom prst="rect">
+            <a:avLst/>
+          </a:prstGeom>
+          <a:ln>
+            <a:noFill/>
+          </a:ln>
+        </p:spPr>
+        <p:style>
+          <a:lnRef idx="2">
+            <a:schemeClr val="accent1">
+              <a:shade val="50000"/>
+            </a:schemeClr>
+          </a:lnRef>
+          <a:fillRef idx="1">
+            <a:schemeClr val="accent1"/>
+          </a:fillRef>
+          <a:effectRef idx="0">
+            <a:schemeClr val="accent1"/>
+          </a:effectRef>
+          <a:fontRef idx="minor">
+            <a:schemeClr val="lt1"/>
+          </a:fontRef>
+        </p:style>
+        <p:txBody>
+          <a:bodyPr anchor="ctr"/>
+          <a:lstStyle/>
+          <a:p>
+            <a:pPr algn="ctr">
+              <a:defRPr/>
+            </a:pPr>
+            <a:endParaRPr lang="en-US" dirty="0"/>
+          </a:p>
+        </p:txBody>
+      </p:sp>
+      <p:sp>
+        <p:nvSpPr>
+          <p:cNvPr id="16" name="Rectangle 15"/>
+          <p:cNvSpPr/>
+          <p:nvPr/>
+        </p:nvSpPr>
+        <p:spPr>
+          <a:xfrm>
+            <a:off x="3886200" y="3181290"/>
+            <a:ext cx="76200" cy="76200"/>
+          </a:xfrm>
+          <a:prstGeom prst="rect">
+            <a:avLst/>
+          </a:prstGeom>
+          <a:ln>
+            <a:noFill/>
+          </a:ln>
+        </p:spPr>
+        <p:style>
+          <a:lnRef idx="2">
+            <a:schemeClr val="accent1">
+              <a:shade val="50000"/>
+            </a:schemeClr>
+          </a:lnRef>
+          <a:fillRef idx="1">
+            <a:schemeClr val="accent1"/>
+          </a:fillRef>
+          <a:effectRef idx="0">
+            <a:schemeClr val="accent1"/>
+          </a:effectRef>
+          <a:fontRef idx="minor">
+            <a:schemeClr val="lt1"/>
+          </a:fontRef>
+        </p:style>
+        <p:txBody>
+          <a:bodyPr anchor="ctr"/>
+          <a:lstStyle/>
+          <a:p>
+            <a:pPr algn="ctr">
+              <a:defRPr/>
+            </a:pPr>
+            <a:endParaRPr lang="en-US" dirty="0"/>
+          </a:p>
+        </p:txBody>
+      </p:sp>
+      <p:sp>
+        <p:nvSpPr>
+          <p:cNvPr id="17" name="Rectangle 16"/>
+          <p:cNvSpPr/>
+          <p:nvPr/>
+        </p:nvSpPr>
+        <p:spPr>
+          <a:xfrm>
+            <a:off x="4800600" y="3181290"/>
+            <a:ext cx="76200" cy="76200"/>
+          </a:xfrm>
+          <a:prstGeom prst="rect">
+            <a:avLst/>
+          </a:prstGeom>
+          <a:ln>
+            <a:noFill/>
+          </a:ln>
+        </p:spPr>
+        <p:style>
+          <a:lnRef idx="2">
+            <a:schemeClr val="accent1">
+              <a:shade val="50000"/>
+            </a:schemeClr>
+          </a:lnRef>
+          <a:fillRef idx="1">
+            <a:schemeClr val="accent1"/>
+          </a:fillRef>
+          <a:effectRef idx="0">
+            <a:schemeClr val="accent1"/>
+          </a:effectRef>
+          <a:fontRef idx="minor">
+            <a:schemeClr val="lt1"/>
+          </a:fontRef>
+        </p:style>
+        <p:txBody>
+          <a:bodyPr anchor="ctr"/>
+          <a:lstStyle/>
+          <a:p>
+            <a:pPr algn="ctr">
+              <a:defRPr/>
+            </a:pPr>
+            <a:endParaRPr lang="en-US" dirty="0"/>
+          </a:p>
+        </p:txBody>
+      </p:sp>
+      <p:sp>
+        <p:nvSpPr>
+          <p:cNvPr id="18" name="Rectangle 17"/>
+          <p:cNvSpPr/>
+          <p:nvPr/>
+        </p:nvSpPr>
+        <p:spPr>
+          <a:xfrm>
+            <a:off x="4343400" y="3181290"/>
+            <a:ext cx="76200" cy="76200"/>
+          </a:xfrm>
+          <a:prstGeom prst="rect">
+            <a:avLst/>
+          </a:prstGeom>
+          <a:solidFill>
+            <a:srgbClr val="FF0000"/>
+          </a:solidFill>
+          <a:ln>
+            <a:noFill/>
+          </a:ln>
+        </p:spPr>
+        <p:style>
+          <a:lnRef idx="2">
+            <a:schemeClr val="accent1">
+              <a:shade val="50000"/>
+            </a:schemeClr>
+          </a:lnRef>
+          <a:fillRef idx="1">
+            <a:schemeClr val="accent1"/>
+          </a:fillRef>
+          <a:effectRef idx="0">
+            <a:schemeClr val="accent1"/>
+          </a:effectRef>
+          <a:fontRef idx="minor">
+            <a:schemeClr val="lt1"/>
+          </a:fontRef>
+        </p:style>
+        <p:txBody>
+          <a:bodyPr anchor="ctr"/>
+          <a:lstStyle/>
+          <a:p>
+            <a:pPr algn="ctr">
+              <a:defRPr/>
+            </a:pPr>
+            <a:endParaRPr lang="en-US" dirty="0"/>
+          </a:p>
+        </p:txBody>
+      </p:sp>
+      <p:sp>
+        <p:nvSpPr>
+          <p:cNvPr id="19" name="Rectangle 18"/>
+          <p:cNvSpPr/>
+          <p:nvPr/>
+        </p:nvSpPr>
+        <p:spPr>
+          <a:xfrm>
+            <a:off x="4572000" y="3181290"/>
+            <a:ext cx="76200" cy="76200"/>
+          </a:xfrm>
+          <a:prstGeom prst="rect">
+            <a:avLst/>
+          </a:prstGeom>
+          <a:solidFill>
+            <a:srgbClr val="FF0000"/>
+          </a:solidFill>
+          <a:ln>
+            <a:noFill/>
+          </a:ln>
+        </p:spPr>
+        <p:style>
+          <a:lnRef idx="2">
+            <a:schemeClr val="accent1">
+              <a:shade val="50000"/>
+            </a:schemeClr>
+          </a:lnRef>
+          <a:fillRef idx="1">
+            <a:schemeClr val="accent1"/>
+          </a:fillRef>
+          <a:effectRef idx="0">
+            <a:schemeClr val="accent1"/>
+          </a:effectRef>
+          <a:fontRef idx="minor">
+            <a:schemeClr val="lt1"/>
+          </a:fontRef>
+        </p:style>
+        <p:txBody>
+          <a:bodyPr anchor="ctr"/>
+          <a:lstStyle/>
+          <a:p>
+            <a:pPr algn="ctr">
+              <a:defRPr/>
+            </a:pPr>
+            <a:endParaRPr lang="en-US" dirty="0"/>
+          </a:p>
+        </p:txBody>
+      </p:sp>
+      <p:sp>
+        <p:nvSpPr>
+          <p:cNvPr id="20" name="Rectangle 19"/>
+          <p:cNvSpPr/>
+          <p:nvPr/>
+        </p:nvSpPr>
+        <p:spPr>
+          <a:xfrm>
+            <a:off x="4648200" y="2647890"/>
+            <a:ext cx="76200" cy="76200"/>
+          </a:xfrm>
+          <a:prstGeom prst="rect">
+            <a:avLst/>
+          </a:prstGeom>
+          <a:solidFill>
+            <a:srgbClr val="FF0000"/>
+          </a:solidFill>
+          <a:ln>
+            <a:noFill/>
+          </a:ln>
+        </p:spPr>
+        <p:style>
+          <a:lnRef idx="2">
+            <a:schemeClr val="accent1">
+              <a:shade val="50000"/>
+            </a:schemeClr>
+          </a:lnRef>
+          <a:fillRef idx="1">
+            <a:schemeClr val="accent1"/>
+          </a:fillRef>
+          <a:effectRef idx="0">
+            <a:schemeClr val="accent1"/>
+          </a:effectRef>
+          <a:fontRef idx="minor">
+            <a:schemeClr val="lt1"/>
+          </a:fontRef>
+        </p:style>
+        <p:txBody>
+          <a:bodyPr anchor="ctr"/>
+          <a:lstStyle/>
+          <a:p>
+            <a:pPr algn="r">
+              <a:defRPr/>
+            </a:pPr>
+            <a:endParaRPr lang="en-US" dirty="0"/>
+          </a:p>
+        </p:txBody>
+      </p:sp>
+      <p:sp>
+        <p:nvSpPr>
+          <p:cNvPr id="21" name="Rectangle 20"/>
+          <p:cNvSpPr/>
+          <p:nvPr/>
+        </p:nvSpPr>
+        <p:spPr>
+          <a:xfrm>
+            <a:off x="3733800" y="4400490"/>
+            <a:ext cx="76200" cy="76200"/>
+          </a:xfrm>
+          <a:prstGeom prst="rect">
+            <a:avLst/>
+          </a:prstGeom>
+          <a:solidFill>
+            <a:srgbClr val="FF0000"/>
+          </a:solidFill>
+          <a:ln>
+            <a:noFill/>
+          </a:ln>
+        </p:spPr>
+        <p:style>
+          <a:lnRef idx="2">
+            <a:schemeClr val="accent1">
+              <a:shade val="50000"/>
+            </a:schemeClr>
+          </a:lnRef>
+          <a:fillRef idx="1">
+            <a:schemeClr val="accent1"/>
+          </a:fillRef>
+          <a:effectRef idx="0">
+            <a:schemeClr val="accent1"/>
+          </a:effectRef>
+          <a:fontRef idx="minor">
+            <a:schemeClr val="lt1"/>
+          </a:fontRef>
+        </p:style>
+        <p:txBody>
+          <a:bodyPr anchor="ctr"/>
+          <a:lstStyle/>
+          <a:p>
+            <a:pPr algn="ctr">
+              <a:defRPr/>
+            </a:pPr>
+            <a:endParaRPr lang="en-US" dirty="0"/>
+          </a:p>
+        </p:txBody>
+      </p:sp>
+      <p:sp>
+        <p:nvSpPr>
+          <p:cNvPr id="22" name="Rectangle 21"/>
+          <p:cNvSpPr/>
+          <p:nvPr/>
+        </p:nvSpPr>
+        <p:spPr>
+          <a:xfrm>
+            <a:off x="4038600" y="3714690"/>
+            <a:ext cx="76200" cy="76200"/>
+          </a:xfrm>
+          <a:prstGeom prst="rect">
+            <a:avLst/>
+          </a:prstGeom>
+          <a:solidFill>
+            <a:srgbClr val="FF0000"/>
+          </a:solidFill>
+          <a:ln>
+            <a:noFill/>
+          </a:ln>
+        </p:spPr>
+        <p:style>
+          <a:lnRef idx="2">
+            <a:schemeClr val="accent1">
+              <a:shade val="50000"/>
+            </a:schemeClr>
+          </a:lnRef>
+          <a:fillRef idx="1">
+            <a:schemeClr val="accent1"/>
+          </a:fillRef>
+          <a:effectRef idx="0">
+            <a:schemeClr val="accent1"/>
+          </a:effectRef>
+          <a:fontRef idx="minor">
+            <a:schemeClr val="lt1"/>
+          </a:fontRef>
+        </p:style>
+        <p:txBody>
+          <a:bodyPr anchor="ctr"/>
+          <a:lstStyle/>
+          <a:p>
+            <a:pPr algn="ctr">
+              <a:defRPr/>
+            </a:pPr>
+            <a:endParaRPr lang="en-US" dirty="0"/>
+          </a:p>
+        </p:txBody>
+      </p:sp>
+      <p:sp>
+        <p:nvSpPr>
+          <p:cNvPr id="23" name="Rectangle 22"/>
+          <p:cNvSpPr/>
+          <p:nvPr/>
+        </p:nvSpPr>
+        <p:spPr>
+          <a:xfrm>
+            <a:off x="3886200" y="2647890"/>
+            <a:ext cx="76200" cy="76200"/>
+          </a:xfrm>
+          <a:prstGeom prst="rect">
+            <a:avLst/>
+          </a:prstGeom>
+          <a:solidFill>
+            <a:srgbClr val="FF0000"/>
+          </a:solidFill>
+          <a:ln>
+            <a:noFill/>
+          </a:ln>
+        </p:spPr>
+        <p:style>
+          <a:lnRef idx="2">
+            <a:schemeClr val="accent1">
+              <a:shade val="50000"/>
+            </a:schemeClr>
+          </a:lnRef>
+          <a:fillRef idx="1">
+            <a:schemeClr val="accent1"/>
+          </a:fillRef>
+          <a:effectRef idx="0">
+            <a:schemeClr val="accent1"/>
+          </a:effectRef>
+          <a:fontRef idx="minor">
+            <a:schemeClr val="lt1"/>
+          </a:fontRef>
+        </p:style>
+        <p:txBody>
+          <a:bodyPr anchor="ctr"/>
+          <a:lstStyle/>
+          <a:p>
+            <a:pPr algn="ctr">
+              <a:defRPr/>
+            </a:pPr>
+            <a:endParaRPr lang="en-US" dirty="0"/>
+          </a:p>
+        </p:txBody>
+      </p:sp>
+      <p:sp>
+        <p:nvSpPr>
+          <p:cNvPr id="24" name="Rectangle 23"/>
+          <p:cNvSpPr/>
+          <p:nvPr/>
+        </p:nvSpPr>
+        <p:spPr>
+          <a:xfrm>
+            <a:off x="4267200" y="3714690"/>
+            <a:ext cx="76200" cy="76200"/>
+          </a:xfrm>
+          <a:prstGeom prst="rect">
+            <a:avLst/>
+          </a:prstGeom>
+          <a:solidFill>
+            <a:srgbClr val="FF0000"/>
+          </a:solidFill>
+          <a:ln>
+            <a:noFill/>
+          </a:ln>
+        </p:spPr>
+        <p:style>
+          <a:lnRef idx="2">
+            <a:schemeClr val="accent1">
+              <a:shade val="50000"/>
+            </a:schemeClr>
+          </a:lnRef>
+          <a:fillRef idx="1">
+            <a:schemeClr val="accent1"/>
+          </a:fillRef>
+          <a:effectRef idx="0">
+            <a:schemeClr val="accent1"/>
+          </a:effectRef>
+          <a:fontRef idx="minor">
+            <a:schemeClr val="lt1"/>
+          </a:fontRef>
+        </p:style>
+        <p:txBody>
+          <a:bodyPr anchor="ctr"/>
+          <a:lstStyle/>
+          <a:p>
+            <a:pPr algn="ctr">
+              <a:defRPr/>
+            </a:pPr>
+            <a:endParaRPr lang="en-US" dirty="0"/>
+          </a:p>
+        </p:txBody>
+      </p:sp>
+      <p:sp>
+        <p:nvSpPr>
+          <p:cNvPr id="25" name="Rectangle 24"/>
+          <p:cNvSpPr/>
+          <p:nvPr/>
+        </p:nvSpPr>
+        <p:spPr>
+          <a:xfrm>
+            <a:off x="4724400" y="4400490"/>
+            <a:ext cx="76200" cy="76200"/>
+          </a:xfrm>
+          <a:prstGeom prst="rect">
+            <a:avLst/>
+          </a:prstGeom>
+          <a:solidFill>
+            <a:srgbClr val="FF0000"/>
+          </a:solidFill>
+          <a:ln>
+            <a:noFill/>
+          </a:ln>
+        </p:spPr>
+        <p:style>
+          <a:lnRef idx="2">
+            <a:schemeClr val="accent1">
+              <a:shade val="50000"/>
+            </a:schemeClr>
+          </a:lnRef>
+          <a:fillRef idx="1">
+            <a:schemeClr val="accent1"/>
+          </a:fillRef>
+          <a:effectRef idx="0">
+            <a:schemeClr val="accent1"/>
+          </a:effectRef>
+          <a:fontRef idx="minor">
+            <a:schemeClr val="lt1"/>
+          </a:fontRef>
+        </p:style>
+        <p:txBody>
+          <a:bodyPr anchor="ctr"/>
+          <a:lstStyle/>
+          <a:p>
+            <a:pPr algn="ctr">
+              <a:defRPr/>
+            </a:pPr>
+            <a:endParaRPr lang="en-US" dirty="0"/>
+          </a:p>
+        </p:txBody>
+      </p:sp>
+      <p:sp>
+        <p:nvSpPr>
+          <p:cNvPr id="26" name="Rectangle 25"/>
+          <p:cNvSpPr/>
+          <p:nvPr/>
+        </p:nvSpPr>
+        <p:spPr>
+          <a:xfrm>
+            <a:off x="4114800" y="3181290"/>
+            <a:ext cx="76200" cy="76200"/>
+          </a:xfrm>
+          <a:prstGeom prst="rect">
+            <a:avLst/>
+          </a:prstGeom>
+          <a:solidFill>
+            <a:srgbClr val="FF0000"/>
+          </a:solidFill>
+          <a:ln>
+            <a:noFill/>
+          </a:ln>
+        </p:spPr>
+        <p:style>
+          <a:lnRef idx="2">
+            <a:schemeClr val="accent1">
+              <a:shade val="50000"/>
+            </a:schemeClr>
+          </a:lnRef>
+          <a:fillRef idx="1">
+            <a:schemeClr val="accent1"/>
+          </a:fillRef>
+          <a:effectRef idx="0">
+            <a:schemeClr val="accent1"/>
+          </a:effectRef>
+          <a:fontRef idx="minor">
+            <a:schemeClr val="lt1"/>
+          </a:fontRef>
+        </p:style>
+        <p:txBody>
+          <a:bodyPr anchor="ctr"/>
+          <a:lstStyle/>
+          <a:p>
+            <a:pPr algn="ctr">
+              <a:defRPr/>
+            </a:pPr>
+            <a:endParaRPr lang="en-US" dirty="0"/>
+          </a:p>
+        </p:txBody>
+      </p:sp>
+      <p:sp>
+        <p:nvSpPr>
+          <p:cNvPr id="27" name="Rectangle 26"/>
+          <p:cNvSpPr/>
+          <p:nvPr/>
+        </p:nvSpPr>
+        <p:spPr>
+          <a:xfrm>
+            <a:off x="4419600" y="4400490"/>
+            <a:ext cx="76200" cy="76200"/>
+          </a:xfrm>
+          <a:prstGeom prst="rect">
+            <a:avLst/>
+          </a:prstGeom>
+          <a:solidFill>
+            <a:srgbClr val="FF0000"/>
+          </a:solidFill>
+          <a:ln>
+            <a:noFill/>
+          </a:ln>
+        </p:spPr>
+        <p:style>
+          <a:lnRef idx="2">
+            <a:schemeClr val="accent1">
+              <a:shade val="50000"/>
+            </a:schemeClr>
+          </a:lnRef>
+          <a:fillRef idx="1">
+            <a:schemeClr val="accent1"/>
+          </a:fillRef>
+          <a:effectRef idx="0">
+            <a:schemeClr val="accent1"/>
+          </a:effectRef>
+          <a:fontRef idx="minor">
+            <a:schemeClr val="lt1"/>
+          </a:fontRef>
+        </p:style>
+        <p:txBody>
+          <a:bodyPr anchor="ctr"/>
+          <a:lstStyle/>
+          <a:p>
+            <a:pPr algn="ctr">
+              <a:defRPr/>
+            </a:pPr>
+            <a:endParaRPr lang="en-US" dirty="0"/>
+          </a:p>
+        </p:txBody>
+      </p:sp>
+      <p:sp>
+        <p:nvSpPr>
+          <p:cNvPr id="28" name="Rectangle 27"/>
+          <p:cNvSpPr/>
+          <p:nvPr/>
+        </p:nvSpPr>
+        <p:spPr>
+          <a:xfrm>
+            <a:off x="4495800" y="3714690"/>
+            <a:ext cx="76200" cy="76200"/>
+          </a:xfrm>
+          <a:prstGeom prst="rect">
+            <a:avLst/>
+          </a:prstGeom>
+          <a:solidFill>
+            <a:srgbClr val="FF0000"/>
+          </a:solidFill>
+          <a:ln>
+            <a:noFill/>
+          </a:ln>
+        </p:spPr>
+        <p:style>
+          <a:lnRef idx="2">
+            <a:schemeClr val="accent1">
+              <a:shade val="50000"/>
+            </a:schemeClr>
+          </a:lnRef>
+          <a:fillRef idx="1">
+            <a:schemeClr val="accent1"/>
+          </a:fillRef>
+          <a:effectRef idx="0">
+            <a:schemeClr val="accent1"/>
+          </a:effectRef>
+          <a:fontRef idx="minor">
+            <a:schemeClr val="lt1"/>
+          </a:fontRef>
+        </p:style>
+        <p:txBody>
+          <a:bodyPr anchor="ctr"/>
+          <a:lstStyle/>
+          <a:p>
+            <a:pPr algn="ctr">
+              <a:defRPr/>
+            </a:pPr>
+            <a:endParaRPr lang="en-US" dirty="0"/>
+          </a:p>
+        </p:txBody>
+      </p:sp>
+      <p:sp>
+        <p:nvSpPr>
+          <p:cNvPr id="29" name="Rectangle 28"/>
+          <p:cNvSpPr/>
+          <p:nvPr/>
+        </p:nvSpPr>
+        <p:spPr>
+          <a:xfrm>
+            <a:off x="4343400" y="2647890"/>
+            <a:ext cx="76200" cy="76200"/>
+          </a:xfrm>
+          <a:prstGeom prst="rect">
+            <a:avLst/>
+          </a:prstGeom>
+          <a:solidFill>
+            <a:srgbClr val="FF0000"/>
+          </a:solidFill>
+          <a:ln>
+            <a:noFill/>
+          </a:ln>
+        </p:spPr>
+        <p:style>
+          <a:lnRef idx="2">
+            <a:schemeClr val="accent1">
+              <a:shade val="50000"/>
+            </a:schemeClr>
+          </a:lnRef>
+          <a:fillRef idx="1">
+            <a:schemeClr val="accent1"/>
+          </a:fillRef>
+          <a:effectRef idx="0">
+            <a:schemeClr val="accent1"/>
+          </a:effectRef>
+          <a:fontRef idx="minor">
+            <a:schemeClr val="lt1"/>
+          </a:fontRef>
+        </p:style>
+        <p:txBody>
+          <a:bodyPr anchor="ctr"/>
+          <a:lstStyle/>
+          <a:p>
+            <a:pPr algn="ctr">
+              <a:defRPr/>
+            </a:pPr>
+            <a:endParaRPr lang="en-US" dirty="0"/>
+          </a:p>
+        </p:txBody>
+      </p:sp>
+      <p:cxnSp>
+        <p:nvCxnSpPr>
+          <p:cNvPr id="30" name="Straight Arrow Connector 29"/>
+          <p:cNvCxnSpPr/>
+          <p:nvPr/>
+        </p:nvCxnSpPr>
+        <p:spPr>
+          <a:xfrm>
+            <a:off x="3657600" y="5162490"/>
+            <a:ext cx="4114800" cy="0"/>
+          </a:xfrm>
+          <a:prstGeom prst="straightConnector1">
+            <a:avLst/>
+          </a:prstGeom>
+          <a:ln w="19050">
+            <a:solidFill>
+              <a:srgbClr val="000090"/>
+            </a:solidFill>
+            <a:tailEnd type="arrow"/>
+          </a:ln>
+        </p:spPr>
+        <p:style>
+          <a:lnRef idx="2">
+            <a:schemeClr val="accent1"/>
+          </a:lnRef>
+          <a:fillRef idx="0">
+            <a:schemeClr val="accent1"/>
+          </a:fillRef>
+          <a:effectRef idx="1">
+            <a:schemeClr val="accent1"/>
+          </a:effectRef>
+          <a:fontRef idx="minor">
+            <a:schemeClr val="tx1"/>
+          </a:fontRef>
+        </p:style>
+      </p:cxnSp>
+      <p:sp>
+        <p:nvSpPr>
+          <p:cNvPr id="31" name="TextBox 30"/>
+          <p:cNvSpPr txBox="1"/>
+          <p:nvPr/>
+        </p:nvSpPr>
+        <p:spPr>
+          <a:xfrm>
+            <a:off x="5105400" y="5162490"/>
+            <a:ext cx="914400" cy="400110"/>
+          </a:xfrm>
+          <a:prstGeom prst="rect">
+            <a:avLst/>
+          </a:prstGeom>
+          <a:noFill/>
+        </p:spPr>
+        <p:txBody>
+          <a:bodyPr wrap="square" rtlCol="0">
+            <a:spAutoFit/>
+          </a:bodyPr>
+          <a:lstStyle/>
+          <a:p>
+            <a:r>
+              <a:rPr lang="en-US" sz="2000" dirty="0" smtClean="0"/>
+              <a:t>Time</a:t>
+            </a:r>
+            <a:endParaRPr lang="en-US" sz="2000" dirty="0"/>
+          </a:p>
+        </p:txBody>
+      </p:sp>
+      <p:grpSp>
+        <p:nvGrpSpPr>
+          <p:cNvPr id="32" name="Group 31"/>
+          <p:cNvGrpSpPr/>
+          <p:nvPr/>
+        </p:nvGrpSpPr>
+        <p:grpSpPr>
+          <a:xfrm>
+            <a:off x="762000" y="2590800"/>
+            <a:ext cx="2133600" cy="2514600"/>
+            <a:chOff x="762000" y="2590800"/>
+            <a:chExt cx="2133600" cy="2514600"/>
+          </a:xfrm>
+        </p:grpSpPr>
+        <p:sp>
+          <p:nvSpPr>
+            <p:cNvPr id="33" name="Oval 32"/>
+            <p:cNvSpPr/>
+            <p:nvPr/>
+          </p:nvSpPr>
+          <p:spPr>
+            <a:xfrm>
+              <a:off x="2057400" y="2743200"/>
+              <a:ext cx="838200" cy="838200"/>
+            </a:xfrm>
+            <a:prstGeom prst="ellipse">
+              <a:avLst/>
+            </a:prstGeom>
+            <a:solidFill>
+              <a:schemeClr val="accent1"/>
+            </a:solidFill>
+            <a:ln>
+              <a:solidFill>
+                <a:schemeClr val="tx1"/>
+              </a:solidFill>
+            </a:ln>
+          </p:spPr>
+          <p:style>
+            <a:lnRef idx="1">
+              <a:schemeClr val="accent1"/>
+            </a:lnRef>
+            <a:fillRef idx="3">
+              <a:schemeClr val="accent1"/>
+            </a:fillRef>
+            <a:effectRef idx="2">
+              <a:schemeClr val="accent1"/>
+            </a:effectRef>
+            <a:fontRef idx="minor">
+              <a:schemeClr val="lt1"/>
+            </a:fontRef>
+          </p:style>
+          <p:txBody>
+            <a:bodyPr rtlCol="0" anchor="ctr"/>
+            <a:lstStyle/>
+            <a:p>
+              <a:pPr algn="ctr"/>
+              <a:r>
+                <a:rPr lang="en-US" dirty="0" smtClean="0"/>
+                <a:t>B</a:t>
+              </a:r>
+              <a:endParaRPr lang="en-US" dirty="0"/>
+            </a:p>
+          </p:txBody>
+        </p:sp>
+        <p:sp>
+          <p:nvSpPr>
+            <p:cNvPr id="34" name="Oval 33"/>
+            <p:cNvSpPr/>
+            <p:nvPr/>
+          </p:nvSpPr>
+          <p:spPr>
+            <a:xfrm>
+              <a:off x="2057400" y="3962400"/>
+              <a:ext cx="838200" cy="914400"/>
+            </a:xfrm>
+            <a:prstGeom prst="ellipse">
+              <a:avLst/>
+            </a:prstGeom>
+            <a:solidFill>
+              <a:schemeClr val="accent3"/>
+            </a:solidFill>
+            <a:ln>
+              <a:solidFill>
+                <a:schemeClr val="tx1"/>
+              </a:solidFill>
+            </a:ln>
+          </p:spPr>
+          <p:style>
+            <a:lnRef idx="1">
+              <a:schemeClr val="accent1"/>
+            </a:lnRef>
+            <a:fillRef idx="3">
+              <a:schemeClr val="accent1"/>
+            </a:fillRef>
+            <a:effectRef idx="2">
+              <a:schemeClr val="accent1"/>
+            </a:effectRef>
+            <a:fontRef idx="minor">
+              <a:schemeClr val="lt1"/>
+            </a:fontRef>
+          </p:style>
+          <p:txBody>
+            <a:bodyPr rtlCol="0" anchor="ctr"/>
+            <a:lstStyle/>
+            <a:p>
+              <a:pPr algn="ctr"/>
+              <a:r>
+                <a:rPr lang="en-US" dirty="0"/>
+                <a:t>C</a:t>
+              </a:r>
+            </a:p>
+          </p:txBody>
+        </p:sp>
+        <p:sp>
+          <p:nvSpPr>
+            <p:cNvPr id="35" name="Oval 34"/>
+            <p:cNvSpPr/>
+            <p:nvPr/>
+          </p:nvSpPr>
+          <p:spPr>
+            <a:xfrm>
+              <a:off x="762000" y="2590800"/>
+              <a:ext cx="685800" cy="2514600"/>
+            </a:xfrm>
+            <a:prstGeom prst="ellipse">
+              <a:avLst/>
+            </a:prstGeom>
+            <a:solidFill>
+              <a:srgbClr val="F8CFC8"/>
+            </a:solidFill>
+          </p:spPr>
+          <p:style>
+            <a:lnRef idx="2">
+              <a:schemeClr val="dk1"/>
+            </a:lnRef>
+            <a:fillRef idx="1">
+              <a:schemeClr val="lt1"/>
+            </a:fillRef>
+            <a:effectRef idx="0">
+              <a:schemeClr val="dk1"/>
+            </a:effectRef>
+            <a:fontRef idx="minor">
+              <a:schemeClr val="dk1"/>
+            </a:fontRef>
+          </p:style>
+          <p:txBody>
+            <a:bodyPr rtlCol="0" anchor="ctr"/>
+            <a:lstStyle/>
+            <a:p>
+              <a:pPr algn="ctr"/>
+              <a:endParaRPr lang="en-US">
+                <a:solidFill>
+                  <a:srgbClr val="FE8637"/>
+                </a:solidFill>
+              </a:endParaRPr>
+            </a:p>
+          </p:txBody>
+        </p:sp>
+        <p:sp>
+          <p:nvSpPr>
+            <p:cNvPr id="36" name="Oval 35"/>
+            <p:cNvSpPr/>
+            <p:nvPr/>
+          </p:nvSpPr>
+          <p:spPr>
+            <a:xfrm>
+              <a:off x="1066800" y="3124200"/>
+              <a:ext cx="9144" cy="9144"/>
+            </a:xfrm>
+            <a:prstGeom prst="ellipse">
+              <a:avLst/>
+            </a:prstGeom>
+            <a:solidFill>
+              <a:schemeClr val="tx1"/>
+            </a:solidFill>
+          </p:spPr>
+          <p:style>
+            <a:lnRef idx="2">
+              <a:schemeClr val="dk1"/>
+            </a:lnRef>
+            <a:fillRef idx="1">
+              <a:schemeClr val="lt1"/>
+            </a:fillRef>
+            <a:effectRef idx="0">
+              <a:schemeClr val="dk1"/>
+            </a:effectRef>
+            <a:fontRef idx="minor">
+              <a:schemeClr val="dk1"/>
+            </a:fontRef>
+          </p:style>
+          <p:txBody>
+            <a:bodyPr rtlCol="0" anchor="ctr"/>
+            <a:lstStyle/>
+            <a:p>
+              <a:pPr algn="ctr"/>
+              <a:endParaRPr lang="en-US"/>
+            </a:p>
+          </p:txBody>
+        </p:sp>
+        <p:cxnSp>
+          <p:nvCxnSpPr>
+            <p:cNvPr id="37" name="Straight Connector 36"/>
+            <p:cNvCxnSpPr>
+              <a:stCxn id="35" idx="0"/>
+            </p:cNvCxnSpPr>
+            <p:nvPr/>
+          </p:nvCxnSpPr>
+          <p:spPr>
+            <a:xfrm flipH="1">
+              <a:off x="1066800" y="2590800"/>
+              <a:ext cx="38100" cy="533400"/>
+            </a:xfrm>
+            <a:prstGeom prst="line">
+              <a:avLst/>
+            </a:prstGeom>
+            <a:ln w="38100" cmpd="sng"/>
+          </p:spPr>
+          <p:style>
+            <a:lnRef idx="2">
+              <a:schemeClr val="dk1"/>
+            </a:lnRef>
+            <a:fillRef idx="0">
+              <a:schemeClr val="dk1"/>
+            </a:fillRef>
+            <a:effectRef idx="1">
+              <a:schemeClr val="dk1"/>
+            </a:effectRef>
+            <a:fontRef idx="minor">
+              <a:schemeClr val="tx1"/>
+            </a:fontRef>
+          </p:style>
+        </p:cxnSp>
+        <p:cxnSp>
+          <p:nvCxnSpPr>
+            <p:cNvPr id="38" name="Curved Connector 37"/>
+            <p:cNvCxnSpPr>
+              <a:stCxn id="36" idx="3"/>
+              <a:endCxn id="33" idx="2"/>
+            </p:cNvCxnSpPr>
+            <p:nvPr/>
+          </p:nvCxnSpPr>
+          <p:spPr>
+            <a:xfrm rot="16200000" flipH="1">
+              <a:off x="1547622" y="2652521"/>
+              <a:ext cx="30295" cy="989261"/>
+            </a:xfrm>
+            <a:prstGeom prst="curvedConnector2">
+              <a:avLst/>
+            </a:prstGeom>
+            <a:ln w="38100" cmpd="sng">
+              <a:tailEnd type="arrow"/>
+            </a:ln>
+          </p:spPr>
+          <p:style>
+            <a:lnRef idx="2">
+              <a:schemeClr val="dk1"/>
+            </a:lnRef>
+            <a:fillRef idx="0">
+              <a:schemeClr val="dk1"/>
+            </a:fillRef>
+            <a:effectRef idx="1">
+              <a:schemeClr val="dk1"/>
+            </a:effectRef>
+            <a:fontRef idx="minor">
+              <a:schemeClr val="tx1"/>
+            </a:fontRef>
+          </p:style>
+        </p:cxnSp>
+        <p:cxnSp>
+          <p:nvCxnSpPr>
+            <p:cNvPr id="39" name="Curved Connector 38"/>
+            <p:cNvCxnSpPr>
+              <a:stCxn id="33" idx="3"/>
+            </p:cNvCxnSpPr>
+            <p:nvPr/>
+          </p:nvCxnSpPr>
+          <p:spPr>
+            <a:xfrm rot="5400000">
+              <a:off x="1143000" y="3382448"/>
+              <a:ext cx="960952" cy="1113352"/>
+            </a:xfrm>
+            <a:prstGeom prst="curvedConnector2">
+              <a:avLst/>
+            </a:prstGeom>
+            <a:ln w="38100" cmpd="sng">
+              <a:tailEnd type="arrow"/>
+            </a:ln>
+          </p:spPr>
+          <p:style>
+            <a:lnRef idx="2">
+              <a:schemeClr val="dk1"/>
+            </a:lnRef>
+            <a:fillRef idx="0">
+              <a:schemeClr val="dk1"/>
+            </a:fillRef>
+            <a:effectRef idx="1">
+              <a:schemeClr val="dk1"/>
+            </a:effectRef>
+            <a:fontRef idx="minor">
+              <a:schemeClr val="tx1"/>
+            </a:fontRef>
+          </p:style>
+        </p:cxnSp>
+        <p:cxnSp>
+          <p:nvCxnSpPr>
+            <p:cNvPr id="40" name="Curved Connector 39"/>
+            <p:cNvCxnSpPr>
+              <a:stCxn id="36" idx="3"/>
+              <a:endCxn id="34" idx="1"/>
+            </p:cNvCxnSpPr>
+            <p:nvPr/>
+          </p:nvCxnSpPr>
+          <p:spPr>
+            <a:xfrm rot="16200000" flipH="1">
+              <a:off x="1141992" y="3058151"/>
+              <a:ext cx="964306" cy="1112013"/>
+            </a:xfrm>
+            <a:prstGeom prst="curvedConnector3">
+              <a:avLst>
+                <a:gd name="adj1" fmla="val 32003"/>
+              </a:avLst>
+            </a:prstGeom>
+            <a:ln w="38100" cmpd="sng">
+              <a:tailEnd type="arrow"/>
+            </a:ln>
+          </p:spPr>
+          <p:style>
+            <a:lnRef idx="2">
+              <a:schemeClr val="dk1"/>
+            </a:lnRef>
+            <a:fillRef idx="0">
+              <a:schemeClr val="dk1"/>
+            </a:fillRef>
+            <a:effectRef idx="1">
+              <a:schemeClr val="dk1"/>
+            </a:effectRef>
+            <a:fontRef idx="minor">
+              <a:schemeClr val="tx1"/>
+            </a:fontRef>
+          </p:style>
+        </p:cxnSp>
+        <p:cxnSp>
+          <p:nvCxnSpPr>
+            <p:cNvPr id="41" name="Curved Connector 40"/>
+            <p:cNvCxnSpPr>
+              <a:stCxn id="34" idx="2"/>
+            </p:cNvCxnSpPr>
+            <p:nvPr/>
+          </p:nvCxnSpPr>
+          <p:spPr>
+            <a:xfrm rot="10800000" flipV="1">
+              <a:off x="1066800" y="4419600"/>
+              <a:ext cx="990600" cy="228600"/>
+            </a:xfrm>
+            <a:prstGeom prst="curvedConnector3">
+              <a:avLst/>
+            </a:prstGeom>
+            <a:ln w="38100" cmpd="sng">
+              <a:tailEnd type="arrow"/>
+            </a:ln>
+          </p:spPr>
+          <p:style>
+            <a:lnRef idx="2">
+              <a:schemeClr val="dk1"/>
+            </a:lnRef>
+            <a:fillRef idx="0">
+              <a:schemeClr val="dk1"/>
+            </a:fillRef>
+            <a:effectRef idx="1">
+              <a:schemeClr val="dk1"/>
+            </a:effectRef>
+            <a:fontRef idx="minor">
+              <a:schemeClr val="tx1"/>
+            </a:fontRef>
+          </p:style>
+        </p:cxnSp>
+      </p:grpSp>
+    </p:spTree>
+    <p:extLst>
+      <p:ext uri="{BB962C8B-B14F-4D97-AF65-F5344CB8AC3E}">
+        <p14:creationId xmlns:p14="http://schemas.microsoft.com/office/powerpoint/2010/main" val="2699319054"/>
+      </p:ext>
+    </p:extLst>
+  </p:cSld>
+  <p:clrMapOvr>
+    <a:masterClrMapping/>
+  </p:clrMapOvr>
+  <p:transition xmlns:p14="http://schemas.microsoft.com/office/powerpoint/2010/main">
+    <p:fade/>
+  </p:transition>
+</p:sld>
+</file>
+
+<file path=ppt/slides/slide12.xml><?xml version="1.0" encoding="utf-8"?>
+<p:sld xmlns:a="http://schemas.openxmlformats.org/drawingml/2006/main" xmlns:r="http://schemas.openxmlformats.org/officeDocument/2006/relationships" xmlns:p="http://schemas.openxmlformats.org/presentationml/2006/main">
+  <p:cSld>
+    <p:spTree>
+      <p:nvGrpSpPr>
+        <p:cNvPr id="1" name=""/>
+        <p:cNvGrpSpPr/>
+        <p:nvPr/>
+      </p:nvGrpSpPr>
+      <p:grpSpPr>
+        <a:xfrm>
+          <a:off x="0" y="0"/>
+          <a:ext cx="0" cy="0"/>
+          <a:chOff x="0" y="0"/>
+          <a:chExt cx="0" cy="0"/>
+        </a:xfrm>
+      </p:grpSpPr>
+      <p:sp>
+        <p:nvSpPr>
           <p:cNvPr id="37890" name="Rectangle 2"/>
           <p:cNvSpPr>
             <a:spLocks noGrp="1" noChangeArrowheads="1"/>
@@ -7669,15 +9432,7 @@
           <a:p>
             <a:r>
               <a:rPr lang="en-US" dirty="0" smtClean="0"/>
-              <a:t>MD </a:t>
-            </a:r>
-            <a:r>
-              <a:rPr lang="en-US" dirty="0" smtClean="0"/>
-              <a:t>Parallelization </a:t>
-            </a:r>
-            <a:r>
-              <a:rPr lang="en-US" dirty="0" smtClean="0"/>
-              <a:t>Using Charm++</a:t>
+              <a:t>MD Parallelization Using Charm++</a:t>
             </a:r>
           </a:p>
         </p:txBody>
@@ -7699,7 +9454,7 @@
           <a:p>
             <a:fld id="{51AB2FC9-AB46-3044-91F6-33B60A42CFCA}" type="datetime1">
               <a:rPr lang="en-US" smtClean="0"/>
-              <a:t>9/15/12</a:t>
+              <a:t>11/9/12</a:t>
             </a:fld>
             <a:endParaRPr lang="en-US" dirty="0"/>
           </a:p>
@@ -7746,7 +9501,7 @@
             <a:fld id="{3EF9F3CA-D42A-4F16-9502-7E916E4DA7FE}" type="slidenum">
               <a:rPr lang="en-US" smtClean="0"/>
               <a:pPr/>
-              <a:t>11</a:t>
+              <a:t>12</a:t>
             </a:fld>
             <a:endParaRPr lang="en-US" dirty="0"/>
           </a:p>
@@ -7984,7 +9739,7 @@
 </p:sld>
 </file>
 
-<file path=ppt/slides/slide12.xml><?xml version="1.0" encoding="utf-8"?>
+<file path=ppt/slides/slide13.xml><?xml version="1.0" encoding="utf-8"?>
 <p:sld xmlns:a="http://schemas.openxmlformats.org/drawingml/2006/main" xmlns:r="http://schemas.openxmlformats.org/officeDocument/2006/relationships" xmlns:p="http://schemas.openxmlformats.org/presentationml/2006/main">
   <p:cSld>
     <p:spTree>
@@ -8025,15 +9780,7 @@
           <a:p>
             <a:r>
               <a:rPr lang="en-US" dirty="0" smtClean="0"/>
-              <a:t>MD </a:t>
-            </a:r>
-            <a:r>
-              <a:rPr lang="en-US" dirty="0" smtClean="0"/>
-              <a:t>Parallelization </a:t>
-            </a:r>
-            <a:r>
-              <a:rPr lang="en-US" dirty="0" smtClean="0"/>
-              <a:t>Using Charm++</a:t>
+              <a:t>MD Parallelization Using Charm++</a:t>
             </a:r>
           </a:p>
         </p:txBody>
@@ -8055,7 +9802,7 @@
           <a:p>
             <a:fld id="{51AB2FC9-AB46-3044-91F6-33B60A42CFCA}" type="datetime1">
               <a:rPr lang="en-US" smtClean="0"/>
-              <a:t>9/15/12</a:t>
+              <a:t>11/9/12</a:t>
             </a:fld>
             <a:endParaRPr lang="en-US" dirty="0"/>
           </a:p>
@@ -8102,7 +9849,7 @@
             <a:fld id="{3EF9F3CA-D42A-4F16-9502-7E916E4DA7FE}" type="slidenum">
               <a:rPr lang="en-US" smtClean="0"/>
               <a:pPr/>
-              <a:t>12</a:t>
+              <a:t>13</a:t>
             </a:fld>
             <a:endParaRPr lang="en-US" dirty="0"/>
           </a:p>
@@ -8213,7 +9960,7 @@
 </p:sld>
 </file>
 
-<file path=ppt/slides/slide13.xml><?xml version="1.0" encoding="utf-8"?>
+<file path=ppt/slides/slide14.xml><?xml version="1.0" encoding="utf-8"?>
 <p:sld xmlns:a="http://schemas.openxmlformats.org/drawingml/2006/main" xmlns:r="http://schemas.openxmlformats.org/officeDocument/2006/relationships" xmlns:p="http://schemas.openxmlformats.org/presentationml/2006/main">
   <p:cSld>
     <p:spTree>
@@ -8247,7 +9994,7 @@
           <a:p>
             <a:fld id="{372B16F0-F80E-F742-BFEB-00D7FF4E80B8}" type="datetime1">
               <a:rPr lang="en-US" smtClean="0"/>
-              <a:t>9/15/12</a:t>
+              <a:t>11/9/12</a:t>
             </a:fld>
             <a:endParaRPr lang="en-US" dirty="0"/>
           </a:p>
@@ -8294,7 +10041,7 @@
             <a:fld id="{BFFC72E0-3E7F-4709-B8DF-5EC8A0346E37}" type="slidenum">
               <a:rPr lang="en-US" smtClean="0"/>
               <a:pPr/>
-              <a:t>13</a:t>
+              <a:t>14</a:t>
             </a:fld>
             <a:endParaRPr lang="en-US" dirty="0"/>
           </a:p>
@@ -9294,7 +11041,7 @@
 </p:sld>
 </file>
 
-<file path=ppt/slides/slide14.xml><?xml version="1.0" encoding="utf-8"?>
+<file path=ppt/slides/slide15.xml><?xml version="1.0" encoding="utf-8"?>
 <p:sld xmlns:a="http://schemas.openxmlformats.org/drawingml/2006/main" xmlns:r="http://schemas.openxmlformats.org/officeDocument/2006/relationships" xmlns:p="http://schemas.openxmlformats.org/presentationml/2006/main">
   <p:cSld>
     <p:spTree>
@@ -9461,7 +11208,7 @@
           <a:p>
             <a:fld id="{9CEC6E09-9E16-B641-8195-2727F5189B15}" type="datetime1">
               <a:rPr lang="en-US" smtClean="0"/>
-              <a:t>9/15/12</a:t>
+              <a:t>11/9/12</a:t>
             </a:fld>
             <a:endParaRPr lang="en-US" dirty="0"/>
           </a:p>
@@ -10495,7 +12242,7 @@
             <a:fld id="{3EF9F3CA-D42A-4F16-9502-7E916E4DA7FE}" type="slidenum">
               <a:rPr lang="en-US" smtClean="0"/>
               <a:pPr/>
-              <a:t>14</a:t>
+              <a:t>15</a:t>
             </a:fld>
             <a:endParaRPr lang="en-US" dirty="0"/>
           </a:p>
@@ -10592,7 +12339,7 @@
 </p:sld>
 </file>
 
-<file path=ppt/slides/slide15.xml><?xml version="1.0" encoding="utf-8"?>
+<file path=ppt/slides/slide16.xml><?xml version="1.0" encoding="utf-8"?>
 <p:sld xmlns:a="http://schemas.openxmlformats.org/drawingml/2006/main" xmlns:r="http://schemas.openxmlformats.org/officeDocument/2006/relationships" xmlns:p="http://schemas.openxmlformats.org/presentationml/2006/main">
   <p:cSld>
     <p:spTree>
@@ -10717,7 +12464,7 @@
             </a:pPr>
             <a:fld id="{7C8A7FED-BB5C-A549-B9BD-FA431724F549}" type="datetime1">
               <a:rPr lang="en-US" smtClean="0"/>
-              <a:t>9/15/12</a:t>
+              <a:t>11/9/12</a:t>
             </a:fld>
             <a:endParaRPr lang="en-US" dirty="0"/>
           </a:p>
@@ -10772,7 +12519,7 @@
               <a:pPr>
                 <a:defRPr/>
               </a:pPr>
-              <a:t>15</a:t>
+              <a:t>16</a:t>
             </a:fld>
             <a:endParaRPr lang="en-US" dirty="0"/>
           </a:p>
@@ -10837,7 +12584,6 @@
               <a:rPr lang="en-US" dirty="0" smtClean="0"/>
               <a:t>The Execution Model</a:t>
             </a:r>
-            <a:endParaRPr lang="en-US" dirty="0" smtClean="0"/>
           </a:p>
         </p:txBody>
       </p:sp>
@@ -10910,7 +12656,6 @@
               <a:rPr lang="en-US" dirty="0" smtClean="0"/>
               <a:t> and and runs it completion</a:t>
             </a:r>
-            <a:endParaRPr lang="en-US" dirty="0" smtClean="0"/>
           </a:p>
           <a:p>
             <a:pPr lvl="2"/>
@@ -10935,7 +12680,7 @@
           <a:p>
             <a:fld id="{2058329B-F72F-424F-B632-691B1D38C902}" type="datetime1">
               <a:rPr lang="en-US" smtClean="0"/>
-              <a:t>9/15/12</a:t>
+              <a:t>11/9/12</a:t>
             </a:fld>
             <a:endParaRPr lang="en-US" dirty="0"/>
           </a:p>
@@ -12253,7 +13998,6 @@
               <a:rPr lang="en-US" dirty="0" smtClean="0"/>
               <a:t>Message-driven Execution</a:t>
             </a:r>
-            <a:endParaRPr lang="en-US" dirty="0" smtClean="0"/>
           </a:p>
         </p:txBody>
       </p:sp>
@@ -12311,7 +14055,6 @@
               <a:rPr lang="en-US" dirty="0" smtClean="0"/>
               <a:t>The RTS deposits them in the message Q on the target processor</a:t>
             </a:r>
-            <a:endParaRPr lang="en-US" dirty="0" smtClean="0"/>
           </a:p>
           <a:p>
             <a:pPr lvl="1"/>
@@ -12336,7 +14079,7 @@
           <a:p>
             <a:fld id="{2058329B-F72F-424F-B632-691B1D38C902}" type="datetime1">
               <a:rPr lang="en-US" smtClean="0"/>
-              <a:t>9/15/12</a:t>
+              <a:t>11/9/12</a:t>
             </a:fld>
             <a:endParaRPr lang="en-US" dirty="0"/>
           </a:p>
@@ -13643,13 +15386,8 @@
           <a:p>
             <a:r>
               <a:rPr lang="en-US" dirty="0" smtClean="0"/>
-              <a:t>Message-driven </a:t>
-            </a:r>
-            <a:r>
-              <a:rPr lang="en-US" dirty="0" smtClean="0"/>
-              <a:t>execution is</a:t>
-            </a:r>
-            <a:endParaRPr lang="en-US" dirty="0" smtClean="0"/>
+              <a:t>Message-driven execution is</a:t>
+            </a:r>
           </a:p>
           <a:p>
             <a:pPr lvl="1"/>
@@ -13709,7 +15447,7 @@
           <a:p>
             <a:fld id="{5D7B435F-E373-E44E-AC52-C361462D78B5}" type="datetime1">
               <a:rPr lang="en-US" smtClean="0"/>
-              <a:t>9/15/12</a:t>
+              <a:t>11/9/12</a:t>
             </a:fld>
             <a:endParaRPr lang="en-US" dirty="0"/>
           </a:p>
@@ -15206,7 +16944,7 @@
             </a:pPr>
             <a:fld id="{D06AFF13-112A-264C-B62B-B3320FF1B294}" type="datetime1">
               <a:rPr lang="en-US" smtClean="0"/>
-              <a:t>9/15/12</a:t>
+              <a:t>11/9/12</a:t>
             </a:fld>
             <a:endParaRPr lang="en-US" dirty="0"/>
           </a:p>
@@ -15569,7 +17307,7 @@
             </a:pPr>
             <a:fld id="{7C8A7FED-BB5C-A549-B9BD-FA431724F549}" type="datetime1">
               <a:rPr lang="en-US" smtClean="0"/>
-              <a:t>9/15/12</a:t>
+              <a:t>11/9/12</a:t>
             </a:fld>
             <a:endParaRPr lang="en-US" dirty="0"/>
           </a:p>
@@ -15683,7 +17421,7 @@
             </a:pPr>
             <a:fld id="{5592F02B-3414-D84B-A312-CF464CA9A6D5}" type="datetime1">
               <a:rPr lang="en-US" smtClean="0"/>
-              <a:t>9/15/12</a:t>
+              <a:t>11/9/12</a:t>
             </a:fld>
             <a:endParaRPr lang="en-US" dirty="0"/>
           </a:p>
@@ -15968,8 +17706,8 @@
             <a:avLst/>
           </a:prstGeom>
           <a:solidFill>
-            <a:schemeClr val="accent2">
-              <a:lumMod val="75000"/>
+            <a:schemeClr val="bg2">
+              <a:lumMod val="50000"/>
             </a:schemeClr>
           </a:solidFill>
         </p:spPr>
@@ -16011,7 +17749,7 @@
             <a:avLst/>
           </a:prstGeom>
           <a:solidFill>
-            <a:schemeClr val="accent2">
+            <a:schemeClr val="accent3">
               <a:lumMod val="75000"/>
             </a:schemeClr>
           </a:solidFill>
@@ -16054,8 +17792,9 @@
             <a:avLst/>
           </a:prstGeom>
           <a:solidFill>
-            <a:schemeClr val="accent2">
-              <a:lumMod val="75000"/>
+            <a:schemeClr val="accent5">
+              <a:lumMod val="60000"/>
+              <a:lumOff val="40000"/>
             </a:schemeClr>
           </a:solidFill>
         </p:spPr>
@@ -16097,9 +17836,7 @@
             <a:avLst/>
           </a:prstGeom>
           <a:solidFill>
-            <a:schemeClr val="accent2">
-              <a:lumMod val="75000"/>
-            </a:schemeClr>
+            <a:srgbClr val="CCFFCC"/>
           </a:solidFill>
         </p:spPr>
         <p:style>
@@ -16140,9 +17877,7 @@
             <a:avLst/>
           </a:prstGeom>
           <a:solidFill>
-            <a:schemeClr val="accent2">
-              <a:lumMod val="75000"/>
-            </a:schemeClr>
+            <a:srgbClr val="0000FF"/>
           </a:solidFill>
         </p:spPr>
         <p:style>
@@ -16183,9 +17918,7 @@
             <a:avLst/>
           </a:prstGeom>
           <a:solidFill>
-            <a:schemeClr val="accent2">
-              <a:lumMod val="75000"/>
-            </a:schemeClr>
+            <a:srgbClr val="CCFFCC"/>
           </a:solidFill>
         </p:spPr>
         <p:style>
@@ -16226,10 +17959,13 @@
             <a:avLst/>
           </a:prstGeom>
           <a:solidFill>
-            <a:schemeClr val="accent2">
-              <a:lumMod val="75000"/>
-            </a:schemeClr>
+            <a:srgbClr val="FFFF00"/>
           </a:solidFill>
+          <a:ln>
+            <a:solidFill>
+              <a:srgbClr val="FFFF00"/>
+            </a:solidFill>
+          </a:ln>
         </p:spPr>
         <p:style>
           <a:lnRef idx="1">
@@ -16269,8 +18005,9 @@
             <a:avLst/>
           </a:prstGeom>
           <a:solidFill>
-            <a:schemeClr val="accent2">
-              <a:lumMod val="75000"/>
+            <a:schemeClr val="accent5">
+              <a:lumMod val="60000"/>
+              <a:lumOff val="40000"/>
             </a:schemeClr>
           </a:solidFill>
         </p:spPr>
@@ -16312,7 +18049,7 @@
             <a:avLst/>
           </a:prstGeom>
           <a:solidFill>
-            <a:schemeClr val="accent2">
+            <a:schemeClr val="accent5">
               <a:lumMod val="75000"/>
             </a:schemeClr>
           </a:solidFill>
@@ -16398,9 +18135,7 @@
             <a:avLst/>
           </a:prstGeom>
           <a:solidFill>
-            <a:schemeClr val="accent2">
-              <a:lumMod val="75000"/>
-            </a:schemeClr>
+            <a:srgbClr val="CCFFCC"/>
           </a:solidFill>
         </p:spPr>
         <p:style>
@@ -16441,9 +18176,7 @@
             <a:avLst/>
           </a:prstGeom>
           <a:solidFill>
-            <a:schemeClr val="accent2">
-              <a:lumMod val="75000"/>
-            </a:schemeClr>
+            <a:srgbClr val="CEB500"/>
           </a:solidFill>
         </p:spPr>
         <p:style>
@@ -16484,9 +18217,7 @@
             <a:avLst/>
           </a:prstGeom>
           <a:solidFill>
-            <a:schemeClr val="accent2">
-              <a:lumMod val="75000"/>
-            </a:schemeClr>
+            <a:srgbClr val="862110"/>
           </a:solidFill>
         </p:spPr>
         <p:style>
@@ -16527,9 +18258,7 @@
             <a:avLst/>
           </a:prstGeom>
           <a:solidFill>
-            <a:schemeClr val="accent2">
-              <a:lumMod val="75000"/>
-            </a:schemeClr>
+            <a:srgbClr val="0000FF"/>
           </a:solidFill>
         </p:spPr>
         <p:style>
@@ -16570,8 +18299,9 @@
             <a:avLst/>
           </a:prstGeom>
           <a:solidFill>
-            <a:schemeClr val="accent2">
-              <a:lumMod val="75000"/>
+            <a:schemeClr val="accent5">
+              <a:lumMod val="60000"/>
+              <a:lumOff val="40000"/>
             </a:schemeClr>
           </a:solidFill>
         </p:spPr>
@@ -16613,9 +18343,7 @@
             <a:avLst/>
           </a:prstGeom>
           <a:solidFill>
-            <a:schemeClr val="accent2">
-              <a:lumMod val="75000"/>
-            </a:schemeClr>
+            <a:srgbClr val="CCFFCC"/>
           </a:solidFill>
         </p:spPr>
         <p:style>
@@ -16656,7 +18384,7 @@
             <a:avLst/>
           </a:prstGeom>
           <a:solidFill>
-            <a:schemeClr val="accent2">
+            <a:schemeClr val="accent5">
               <a:lumMod val="75000"/>
             </a:schemeClr>
           </a:solidFill>
@@ -16699,10 +18427,13 @@
             <a:avLst/>
           </a:prstGeom>
           <a:solidFill>
-            <a:schemeClr val="accent2">
-              <a:lumMod val="75000"/>
-            </a:schemeClr>
+            <a:srgbClr val="FFFF00"/>
           </a:solidFill>
+          <a:ln>
+            <a:solidFill>
+              <a:srgbClr val="FFFF00"/>
+            </a:solidFill>
+          </a:ln>
         </p:spPr>
         <p:style>
           <a:lnRef idx="1">
@@ -16742,8 +18473,9 @@
             <a:avLst/>
           </a:prstGeom>
           <a:solidFill>
-            <a:schemeClr val="accent2">
-              <a:lumMod val="75000"/>
+            <a:schemeClr val="accent5">
+              <a:lumMod val="60000"/>
+              <a:lumOff val="40000"/>
             </a:schemeClr>
           </a:solidFill>
         </p:spPr>
@@ -16997,7 +18729,7 @@
         <p:spPr>
           <a:xfrm>
             <a:off x="685800" y="4648200"/>
-            <a:ext cx="7848600" cy="0"/>
+            <a:ext cx="7696200" cy="0"/>
           </a:xfrm>
           <a:prstGeom prst="line">
             <a:avLst/>
@@ -17062,6 +18794,126 @@
           </a:fontRef>
         </p:style>
       </p:cxnSp>
+      <p:sp>
+        <p:nvSpPr>
+          <p:cNvPr id="2" name="TextBox 1"/>
+          <p:cNvSpPr txBox="1"/>
+          <p:nvPr/>
+        </p:nvSpPr>
+        <p:spPr>
+          <a:xfrm>
+            <a:off x="228600" y="1828800"/>
+            <a:ext cx="533400" cy="400110"/>
+          </a:xfrm>
+          <a:prstGeom prst="rect">
+            <a:avLst/>
+          </a:prstGeom>
+          <a:noFill/>
+        </p:spPr>
+        <p:txBody>
+          <a:bodyPr wrap="square" rtlCol="0">
+            <a:spAutoFit/>
+          </a:bodyPr>
+          <a:lstStyle/>
+          <a:p>
+            <a:r>
+              <a:rPr lang="en-US" sz="2000" dirty="0" smtClean="0"/>
+              <a:t>P1</a:t>
+            </a:r>
+            <a:endParaRPr lang="en-US" sz="2000" dirty="0"/>
+          </a:p>
+        </p:txBody>
+      </p:sp>
+      <p:sp>
+        <p:nvSpPr>
+          <p:cNvPr id="40" name="TextBox 39"/>
+          <p:cNvSpPr txBox="1"/>
+          <p:nvPr/>
+        </p:nvSpPr>
+        <p:spPr>
+          <a:xfrm>
+            <a:off x="228600" y="2647890"/>
+            <a:ext cx="533400" cy="400110"/>
+          </a:xfrm>
+          <a:prstGeom prst="rect">
+            <a:avLst/>
+          </a:prstGeom>
+          <a:noFill/>
+        </p:spPr>
+        <p:txBody>
+          <a:bodyPr wrap="square" rtlCol="0">
+            <a:spAutoFit/>
+          </a:bodyPr>
+          <a:lstStyle/>
+          <a:p>
+            <a:r>
+              <a:rPr lang="en-US" sz="2000" dirty="0" smtClean="0"/>
+              <a:t>P2</a:t>
+            </a:r>
+            <a:endParaRPr lang="en-US" sz="2000" dirty="0"/>
+          </a:p>
+        </p:txBody>
+      </p:sp>
+      <p:sp>
+        <p:nvSpPr>
+          <p:cNvPr id="42" name="TextBox 41"/>
+          <p:cNvSpPr txBox="1"/>
+          <p:nvPr/>
+        </p:nvSpPr>
+        <p:spPr>
+          <a:xfrm>
+            <a:off x="304800" y="4191000"/>
+            <a:ext cx="533400" cy="400110"/>
+          </a:xfrm>
+          <a:prstGeom prst="rect">
+            <a:avLst/>
+          </a:prstGeom>
+          <a:noFill/>
+        </p:spPr>
+        <p:txBody>
+          <a:bodyPr wrap="square" rtlCol="0">
+            <a:spAutoFit/>
+          </a:bodyPr>
+          <a:lstStyle/>
+          <a:p>
+            <a:r>
+              <a:rPr lang="en-US" sz="2000" dirty="0" smtClean="0"/>
+              <a:t>P1</a:t>
+            </a:r>
+            <a:endParaRPr lang="en-US" sz="2000" dirty="0"/>
+          </a:p>
+        </p:txBody>
+      </p:sp>
+      <p:sp>
+        <p:nvSpPr>
+          <p:cNvPr id="43" name="TextBox 42"/>
+          <p:cNvSpPr txBox="1"/>
+          <p:nvPr/>
+        </p:nvSpPr>
+        <p:spPr>
+          <a:xfrm>
+            <a:off x="304800" y="5238690"/>
+            <a:ext cx="533400" cy="400110"/>
+          </a:xfrm>
+          <a:prstGeom prst="rect">
+            <a:avLst/>
+          </a:prstGeom>
+          <a:noFill/>
+        </p:spPr>
+        <p:txBody>
+          <a:bodyPr wrap="square" rtlCol="0">
+            <a:spAutoFit/>
+          </a:bodyPr>
+          <a:lstStyle/>
+          <a:p>
+            <a:r>
+              <a:rPr lang="en-US" sz="2000" dirty="0" smtClean="0"/>
+              <a:t>P2</a:t>
+            </a:r>
+            <a:endParaRPr lang="en-US" sz="2000" dirty="0"/>
+          </a:p>
+        </p:txBody>
+      </p:sp>
     </p:spTree>
     <p:extLst>
       <p:ext uri="{BB962C8B-B14F-4D97-AF65-F5344CB8AC3E}">
@@ -17112,7 +18964,7 @@
           <a:p>
             <a:fld id="{6D35BA66-AE5B-0047-9C40-CC00483C2134}" type="datetime1">
               <a:rPr lang="en-US" smtClean="0"/>
-              <a:t>9/15/12</a:t>
+              <a:t>11/9/12</a:t>
             </a:fld>
             <a:endParaRPr lang="en-US" dirty="0"/>
           </a:p>
@@ -17165,37 +19017,6 @@
           </a:p>
         </p:txBody>
       </p:sp>
-      <p:pic>
-        <p:nvPicPr>
-          <p:cNvPr id="26628" name="Picture 4" descr="parallelCompSiamPiece.JPG"/>
-          <p:cNvPicPr>
-            <a:picLocks noChangeAspect="1"/>
-          </p:cNvPicPr>
-          <p:nvPr/>
-        </p:nvPicPr>
-        <p:blipFill>
-          <a:blip r:embed="rId3"/>
-          <a:stretch>
-            <a:fillRect/>
-          </a:stretch>
-        </p:blipFill>
-        <p:spPr bwMode="auto">
-          <a:xfrm>
-            <a:off x="523040" y="2667000"/>
-            <a:ext cx="2406732" cy="2438400"/>
-          </a:xfrm>
-          <a:prstGeom prst="rect">
-            <a:avLst/>
-          </a:prstGeom>
-          <a:noFill/>
-          <a:ln w="9525">
-            <a:noFill/>
-            <a:miter lim="800000"/>
-            <a:headEnd/>
-            <a:tailEnd/>
-          </a:ln>
-        </p:spPr>
-      </p:pic>
       <p:sp>
         <p:nvSpPr>
           <p:cNvPr id="6" name="Rectangle 5"/>
@@ -17204,7 +19025,7 @@
         </p:nvSpPr>
         <p:spPr>
           <a:xfrm>
-            <a:off x="3505200" y="3886200"/>
+            <a:off x="3505200" y="4248090"/>
             <a:ext cx="4343400" cy="381000"/>
           </a:xfrm>
           <a:prstGeom prst="rect">
@@ -17260,7 +19081,7 @@
         </p:nvSpPr>
         <p:spPr>
           <a:xfrm>
-            <a:off x="3505200" y="3200400"/>
+            <a:off x="3505200" y="3562290"/>
             <a:ext cx="4343400" cy="381000"/>
           </a:xfrm>
           <a:prstGeom prst="rect">
@@ -17316,7 +19137,7 @@
         </p:nvSpPr>
         <p:spPr>
           <a:xfrm>
-            <a:off x="3505200" y="2057400"/>
+            <a:off x="3505200" y="2419290"/>
             <a:ext cx="4343400" cy="381000"/>
           </a:xfrm>
           <a:prstGeom prst="rect">
@@ -17372,7 +19193,7 @@
         </p:nvSpPr>
         <p:spPr>
           <a:xfrm>
-            <a:off x="3505200" y="2667000"/>
+            <a:off x="3505200" y="3028890"/>
             <a:ext cx="4343400" cy="381000"/>
           </a:xfrm>
           <a:prstGeom prst="rect">
@@ -17428,7 +19249,7 @@
         </p:nvSpPr>
         <p:spPr>
           <a:xfrm>
-            <a:off x="4800600" y="2286000"/>
+            <a:off x="4800600" y="2647890"/>
             <a:ext cx="76200" cy="76200"/>
           </a:xfrm>
           <a:prstGeom prst="rect">
@@ -17473,7 +19294,7 @@
         </p:nvSpPr>
         <p:spPr>
           <a:xfrm>
-            <a:off x="4724400" y="2819400"/>
+            <a:off x="4724400" y="3181290"/>
             <a:ext cx="76200" cy="76200"/>
           </a:xfrm>
           <a:prstGeom prst="rect">
@@ -17518,7 +19339,7 @@
         </p:nvSpPr>
         <p:spPr>
           <a:xfrm>
-            <a:off x="3733800" y="2286000"/>
+            <a:off x="3733800" y="2647890"/>
             <a:ext cx="76200" cy="76200"/>
           </a:xfrm>
           <a:prstGeom prst="rect">
@@ -17563,7 +19384,7 @@
         </p:nvSpPr>
         <p:spPr>
           <a:xfrm>
-            <a:off x="4038600" y="2286000"/>
+            <a:off x="4038600" y="2647890"/>
             <a:ext cx="76200" cy="76200"/>
           </a:xfrm>
           <a:prstGeom prst="rect">
@@ -17608,7 +19429,7 @@
         </p:nvSpPr>
         <p:spPr>
           <a:xfrm>
-            <a:off x="4343400" y="2819400"/>
+            <a:off x="4343400" y="3181290"/>
             <a:ext cx="76200" cy="76200"/>
           </a:xfrm>
           <a:prstGeom prst="rect">
@@ -17653,7 +19474,7 @@
         </p:nvSpPr>
         <p:spPr>
           <a:xfrm>
-            <a:off x="4495800" y="2286000"/>
+            <a:off x="4495800" y="2647890"/>
             <a:ext cx="76200" cy="76200"/>
           </a:xfrm>
           <a:prstGeom prst="rect">
@@ -17698,7 +19519,7 @@
         </p:nvSpPr>
         <p:spPr>
           <a:xfrm>
-            <a:off x="4267200" y="2286000"/>
+            <a:off x="4267200" y="2647890"/>
             <a:ext cx="76200" cy="76200"/>
           </a:xfrm>
           <a:prstGeom prst="rect">
@@ -17743,7 +19564,7 @@
         </p:nvSpPr>
         <p:spPr>
           <a:xfrm>
-            <a:off x="3886200" y="2819400"/>
+            <a:off x="3886200" y="3181290"/>
             <a:ext cx="76200" cy="76200"/>
           </a:xfrm>
           <a:prstGeom prst="rect">
@@ -17788,7 +19609,7 @@
         </p:nvSpPr>
         <p:spPr>
           <a:xfrm>
-            <a:off x="4114800" y="2819400"/>
+            <a:off x="4114800" y="3181290"/>
             <a:ext cx="76200" cy="76200"/>
           </a:xfrm>
           <a:prstGeom prst="rect">
@@ -17833,7 +19654,7 @@
         </p:nvSpPr>
         <p:spPr>
           <a:xfrm>
-            <a:off x="3657600" y="3352800"/>
+            <a:off x="3657600" y="3714690"/>
             <a:ext cx="76200" cy="76200"/>
           </a:xfrm>
           <a:prstGeom prst="rect">
@@ -17881,7 +19702,7 @@
         </p:nvSpPr>
         <p:spPr>
           <a:xfrm>
-            <a:off x="3581400" y="4038600"/>
+            <a:off x="3581400" y="4400490"/>
             <a:ext cx="76200" cy="76200"/>
           </a:xfrm>
           <a:prstGeom prst="rect">
@@ -17929,7 +19750,7 @@
         </p:nvSpPr>
         <p:spPr>
           <a:xfrm>
-            <a:off x="3886200" y="4038600"/>
+            <a:off x="3886200" y="4400490"/>
             <a:ext cx="76200" cy="76200"/>
           </a:xfrm>
           <a:prstGeom prst="rect">
@@ -17977,7 +19798,7 @@
         </p:nvSpPr>
         <p:spPr>
           <a:xfrm>
-            <a:off x="4191000" y="4038600"/>
+            <a:off x="4191000" y="4400490"/>
             <a:ext cx="76200" cy="76200"/>
           </a:xfrm>
           <a:prstGeom prst="rect">
@@ -18025,7 +19846,7 @@
         </p:nvSpPr>
         <p:spPr>
           <a:xfrm>
-            <a:off x="4419600" y="3352800"/>
+            <a:off x="4419600" y="3714690"/>
             <a:ext cx="76200" cy="76200"/>
           </a:xfrm>
           <a:prstGeom prst="rect">
@@ -18073,7 +19894,7 @@
         </p:nvSpPr>
         <p:spPr>
           <a:xfrm>
-            <a:off x="4876800" y="3352800"/>
+            <a:off x="4876800" y="3714690"/>
             <a:ext cx="76200" cy="76200"/>
           </a:xfrm>
           <a:prstGeom prst="rect">
@@ -18121,7 +19942,7 @@
         </p:nvSpPr>
         <p:spPr>
           <a:xfrm>
-            <a:off x="4648200" y="3352800"/>
+            <a:off x="4648200" y="3714690"/>
             <a:ext cx="76200" cy="76200"/>
           </a:xfrm>
           <a:prstGeom prst="rect">
@@ -18169,7 +19990,7 @@
         </p:nvSpPr>
         <p:spPr>
           <a:xfrm>
-            <a:off x="4876800" y="4038600"/>
+            <a:off x="4876800" y="4400490"/>
             <a:ext cx="76200" cy="76200"/>
           </a:xfrm>
           <a:prstGeom prst="rect">
@@ -18217,7 +20038,7 @@
         </p:nvSpPr>
         <p:spPr>
           <a:xfrm>
-            <a:off x="5029200" y="3352800"/>
+            <a:off x="5029200" y="3714690"/>
             <a:ext cx="76200" cy="76200"/>
           </a:xfrm>
           <a:prstGeom prst="rect">
@@ -18265,7 +20086,7 @@
         </p:nvSpPr>
         <p:spPr>
           <a:xfrm>
-            <a:off x="4572000" y="4038600"/>
+            <a:off x="4572000" y="4400490"/>
             <a:ext cx="76200" cy="76200"/>
           </a:xfrm>
           <a:prstGeom prst="rect">
@@ -18313,7 +20134,7 @@
         </p:nvSpPr>
         <p:spPr>
           <a:xfrm>
-            <a:off x="4191000" y="3352800"/>
+            <a:off x="4191000" y="3714690"/>
             <a:ext cx="76200" cy="76200"/>
           </a:xfrm>
           <a:prstGeom prst="rect">
@@ -18361,7 +20182,7 @@
         </p:nvSpPr>
         <p:spPr>
           <a:xfrm>
-            <a:off x="3886200" y="3352800"/>
+            <a:off x="3886200" y="3714690"/>
             <a:ext cx="76200" cy="76200"/>
           </a:xfrm>
           <a:prstGeom prst="rect">
@@ -18462,7 +20283,7 @@
         </p:nvCxnSpPr>
         <p:spPr>
           <a:xfrm>
-            <a:off x="3657600" y="4800600"/>
+            <a:off x="3657600" y="5162490"/>
             <a:ext cx="4114800" cy="0"/>
           </a:xfrm>
           <a:prstGeom prst="straightConnector1">
@@ -18498,7 +20319,7 @@
         </p:nvSpPr>
         <p:spPr>
           <a:xfrm>
-            <a:off x="5105400" y="4800600"/>
+            <a:off x="5105400" y="5162490"/>
             <a:ext cx="914400" cy="400110"/>
           </a:xfrm>
           <a:prstGeom prst="rect">
@@ -18520,105 +20341,383 @@
           </a:p>
         </p:txBody>
       </p:sp>
-      <p:sp>
-        <p:nvSpPr>
-          <p:cNvPr id="5" name="Oval 4"/>
-          <p:cNvSpPr/>
+      <p:grpSp>
+        <p:nvGrpSpPr>
+          <p:cNvPr id="26645" name="Group 26644"/>
+          <p:cNvGrpSpPr/>
           <p:nvPr/>
-        </p:nvSpPr>
-        <p:spPr>
-          <a:xfrm>
-            <a:off x="2057400" y="2819400"/>
-            <a:ext cx="838200" cy="838200"/>
-          </a:xfrm>
-          <a:prstGeom prst="ellipse">
-            <a:avLst/>
-          </a:prstGeom>
-          <a:solidFill>
-            <a:schemeClr val="accent1"/>
-          </a:solidFill>
-          <a:ln>
+        </p:nvGrpSpPr>
+        <p:grpSpPr>
+          <a:xfrm>
+            <a:off x="762000" y="2590800"/>
+            <a:ext cx="2133600" cy="2514600"/>
+            <a:chOff x="762000" y="2590800"/>
+            <a:chExt cx="2133600" cy="2514600"/>
+          </a:xfrm>
+        </p:grpSpPr>
+        <p:sp>
+          <p:nvSpPr>
+            <p:cNvPr id="5" name="Oval 4"/>
+            <p:cNvSpPr/>
+            <p:nvPr/>
+          </p:nvSpPr>
+          <p:spPr>
+            <a:xfrm>
+              <a:off x="2057400" y="2743200"/>
+              <a:ext cx="838200" cy="838200"/>
+            </a:xfrm>
+            <a:prstGeom prst="ellipse">
+              <a:avLst/>
+            </a:prstGeom>
+            <a:solidFill>
+              <a:schemeClr val="accent1"/>
+            </a:solidFill>
+            <a:ln>
+              <a:solidFill>
+                <a:schemeClr val="tx1"/>
+              </a:solidFill>
+            </a:ln>
+          </p:spPr>
+          <p:style>
+            <a:lnRef idx="1">
+              <a:schemeClr val="accent1"/>
+            </a:lnRef>
+            <a:fillRef idx="3">
+              <a:schemeClr val="accent1"/>
+            </a:fillRef>
+            <a:effectRef idx="2">
+              <a:schemeClr val="accent1"/>
+            </a:effectRef>
+            <a:fontRef idx="minor">
+              <a:schemeClr val="lt1"/>
+            </a:fontRef>
+          </p:style>
+          <p:txBody>
+            <a:bodyPr rtlCol="0" anchor="ctr"/>
+            <a:lstStyle/>
+            <a:p>
+              <a:pPr algn="ctr"/>
+              <a:r>
+                <a:rPr lang="en-US" dirty="0" smtClean="0"/>
+                <a:t>B</a:t>
+              </a:r>
+              <a:endParaRPr lang="en-US" dirty="0"/>
+            </a:p>
+          </p:txBody>
+        </p:sp>
+        <p:sp>
+          <p:nvSpPr>
+            <p:cNvPr id="36" name="Oval 35"/>
+            <p:cNvSpPr/>
+            <p:nvPr/>
+          </p:nvSpPr>
+          <p:spPr>
+            <a:xfrm>
+              <a:off x="2057400" y="3962400"/>
+              <a:ext cx="838200" cy="914400"/>
+            </a:xfrm>
+            <a:prstGeom prst="ellipse">
+              <a:avLst/>
+            </a:prstGeom>
+            <a:solidFill>
+              <a:schemeClr val="accent3"/>
+            </a:solidFill>
+            <a:ln>
+              <a:solidFill>
+                <a:schemeClr val="tx1"/>
+              </a:solidFill>
+            </a:ln>
+          </p:spPr>
+          <p:style>
+            <a:lnRef idx="1">
+              <a:schemeClr val="accent1"/>
+            </a:lnRef>
+            <a:fillRef idx="3">
+              <a:schemeClr val="accent1"/>
+            </a:fillRef>
+            <a:effectRef idx="2">
+              <a:schemeClr val="accent1"/>
+            </a:effectRef>
+            <a:fontRef idx="minor">
+              <a:schemeClr val="lt1"/>
+            </a:fontRef>
+          </p:style>
+          <p:txBody>
+            <a:bodyPr rtlCol="0" anchor="ctr"/>
+            <a:lstStyle/>
+            <a:p>
+              <a:pPr algn="ctr"/>
+              <a:r>
+                <a:rPr lang="en-US" dirty="0"/>
+                <a:t>C</a:t>
+              </a:r>
+            </a:p>
+          </p:txBody>
+        </p:sp>
+        <p:sp>
+          <p:nvSpPr>
+            <p:cNvPr id="20" name="Oval 19"/>
+            <p:cNvSpPr/>
+            <p:nvPr/>
+          </p:nvSpPr>
+          <p:spPr>
+            <a:xfrm>
+              <a:off x="762000" y="2590800"/>
+              <a:ext cx="685800" cy="2514600"/>
+            </a:xfrm>
+            <a:prstGeom prst="ellipse">
+              <a:avLst/>
+            </a:prstGeom>
+            <a:solidFill>
+              <a:srgbClr val="F8CFC8"/>
+            </a:solidFill>
+          </p:spPr>
+          <p:style>
+            <a:lnRef idx="2">
+              <a:schemeClr val="dk1"/>
+            </a:lnRef>
+            <a:fillRef idx="1">
+              <a:schemeClr val="lt1"/>
+            </a:fillRef>
+            <a:effectRef idx="0">
+              <a:schemeClr val="dk1"/>
+            </a:effectRef>
+            <a:fontRef idx="minor">
+              <a:schemeClr val="dk1"/>
+            </a:fontRef>
+          </p:style>
+          <p:txBody>
+            <a:bodyPr rtlCol="0" anchor="ctr"/>
+            <a:lstStyle/>
+            <a:p>
+              <a:pPr algn="ctr"/>
+              <a:endParaRPr lang="en-US">
+                <a:solidFill>
+                  <a:srgbClr val="FE8637"/>
+                </a:solidFill>
+              </a:endParaRPr>
+            </a:p>
+          </p:txBody>
+        </p:sp>
+        <p:sp>
+          <p:nvSpPr>
+            <p:cNvPr id="55" name="Oval 54"/>
+            <p:cNvSpPr/>
+            <p:nvPr/>
+          </p:nvSpPr>
+          <p:spPr>
+            <a:xfrm>
+              <a:off x="1066800" y="3124200"/>
+              <a:ext cx="9144" cy="9144"/>
+            </a:xfrm>
+            <a:prstGeom prst="ellipse">
+              <a:avLst/>
+            </a:prstGeom>
             <a:solidFill>
               <a:schemeClr val="tx1"/>
             </a:solidFill>
-          </a:ln>
-        </p:spPr>
-        <p:style>
-          <a:lnRef idx="1">
-            <a:schemeClr val="accent1"/>
-          </a:lnRef>
-          <a:fillRef idx="3">
-            <a:schemeClr val="accent1"/>
-          </a:fillRef>
-          <a:effectRef idx="2">
-            <a:schemeClr val="accent1"/>
-          </a:effectRef>
-          <a:fontRef idx="minor">
-            <a:schemeClr val="lt1"/>
-          </a:fontRef>
-        </p:style>
-        <p:txBody>
-          <a:bodyPr rtlCol="0" anchor="ctr"/>
-          <a:lstStyle/>
-          <a:p>
-            <a:pPr algn="ctr"/>
-            <a:r>
-              <a:rPr lang="en-US" dirty="0" smtClean="0"/>
-              <a:t>B</a:t>
-            </a:r>
-            <a:endParaRPr lang="en-US" dirty="0"/>
-          </a:p>
-        </p:txBody>
-      </p:sp>
-      <p:sp>
-        <p:nvSpPr>
-          <p:cNvPr id="36" name="Oval 35"/>
-          <p:cNvSpPr/>
-          <p:nvPr/>
-        </p:nvSpPr>
-        <p:spPr>
-          <a:xfrm>
-            <a:off x="2057400" y="4114800"/>
-            <a:ext cx="838200" cy="838200"/>
-          </a:xfrm>
-          <a:prstGeom prst="ellipse">
-            <a:avLst/>
-          </a:prstGeom>
-          <a:solidFill>
-            <a:schemeClr val="accent3"/>
-          </a:solidFill>
-          <a:ln>
-            <a:solidFill>
+          </p:spPr>
+          <p:style>
+            <a:lnRef idx="2">
+              <a:schemeClr val="dk1"/>
+            </a:lnRef>
+            <a:fillRef idx="1">
+              <a:schemeClr val="lt1"/>
+            </a:fillRef>
+            <a:effectRef idx="0">
+              <a:schemeClr val="dk1"/>
+            </a:effectRef>
+            <a:fontRef idx="minor">
+              <a:schemeClr val="dk1"/>
+            </a:fontRef>
+          </p:style>
+          <p:txBody>
+            <a:bodyPr rtlCol="0" anchor="ctr"/>
+            <a:lstStyle/>
+            <a:p>
+              <a:pPr algn="ctr"/>
+              <a:endParaRPr lang="en-US"/>
+            </a:p>
+          </p:txBody>
+        </p:sp>
+        <p:cxnSp>
+          <p:nvCxnSpPr>
+            <p:cNvPr id="60" name="Straight Connector 59"/>
+            <p:cNvCxnSpPr>
+              <a:stCxn id="20" idx="0"/>
+            </p:cNvCxnSpPr>
+            <p:nvPr/>
+          </p:nvCxnSpPr>
+          <p:spPr>
+            <a:xfrm flipH="1">
+              <a:off x="1066800" y="2590800"/>
+              <a:ext cx="38100" cy="533400"/>
+            </a:xfrm>
+            <a:prstGeom prst="line">
+              <a:avLst/>
+            </a:prstGeom>
+            <a:ln w="38100" cmpd="sng"/>
+          </p:spPr>
+          <p:style>
+            <a:lnRef idx="2">
+              <a:schemeClr val="dk1"/>
+            </a:lnRef>
+            <a:fillRef idx="0">
+              <a:schemeClr val="dk1"/>
+            </a:fillRef>
+            <a:effectRef idx="1">
+              <a:schemeClr val="dk1"/>
+            </a:effectRef>
+            <a:fontRef idx="minor">
               <a:schemeClr val="tx1"/>
-            </a:solidFill>
-          </a:ln>
-        </p:spPr>
-        <p:style>
-          <a:lnRef idx="1">
-            <a:schemeClr val="accent1"/>
-          </a:lnRef>
-          <a:fillRef idx="3">
-            <a:schemeClr val="accent1"/>
-          </a:fillRef>
-          <a:effectRef idx="2">
-            <a:schemeClr val="accent1"/>
-          </a:effectRef>
-          <a:fontRef idx="minor">
-            <a:schemeClr val="lt1"/>
-          </a:fontRef>
-        </p:style>
-        <p:txBody>
-          <a:bodyPr rtlCol="0" anchor="ctr"/>
-          <a:lstStyle/>
-          <a:p>
-            <a:pPr algn="ctr"/>
-            <a:r>
-              <a:rPr lang="en-US" dirty="0"/>
-              <a:t>C</a:t>
-            </a:r>
-          </a:p>
-        </p:txBody>
-      </p:sp>
+            </a:fontRef>
+          </p:style>
+        </p:cxnSp>
+        <p:cxnSp>
+          <p:nvCxnSpPr>
+            <p:cNvPr id="62" name="Curved Connector 61"/>
+            <p:cNvCxnSpPr>
+              <a:stCxn id="55" idx="3"/>
+              <a:endCxn id="5" idx="2"/>
+            </p:cNvCxnSpPr>
+            <p:nvPr/>
+          </p:nvCxnSpPr>
+          <p:spPr>
+            <a:xfrm rot="16200000" flipH="1">
+              <a:off x="1547622" y="2652521"/>
+              <a:ext cx="30295" cy="989261"/>
+            </a:xfrm>
+            <a:prstGeom prst="curvedConnector2">
+              <a:avLst/>
+            </a:prstGeom>
+            <a:ln w="38100" cmpd="sng">
+              <a:tailEnd type="arrow"/>
+            </a:ln>
+          </p:spPr>
+          <p:style>
+            <a:lnRef idx="2">
+              <a:schemeClr val="dk1"/>
+            </a:lnRef>
+            <a:fillRef idx="0">
+              <a:schemeClr val="dk1"/>
+            </a:fillRef>
+            <a:effectRef idx="1">
+              <a:schemeClr val="dk1"/>
+            </a:effectRef>
+            <a:fontRef idx="minor">
+              <a:schemeClr val="tx1"/>
+            </a:fontRef>
+          </p:style>
+        </p:cxnSp>
+        <p:cxnSp>
+          <p:nvCxnSpPr>
+            <p:cNvPr id="26624" name="Curved Connector 26623"/>
+            <p:cNvCxnSpPr>
+              <a:stCxn id="5" idx="3"/>
+            </p:cNvCxnSpPr>
+            <p:nvPr/>
+          </p:nvCxnSpPr>
+          <p:spPr>
+            <a:xfrm rot="5400000">
+              <a:off x="1143000" y="3382448"/>
+              <a:ext cx="960952" cy="1113352"/>
+            </a:xfrm>
+            <a:prstGeom prst="curvedConnector2">
+              <a:avLst/>
+            </a:prstGeom>
+            <a:ln w="38100" cmpd="sng">
+              <a:tailEnd type="arrow"/>
+            </a:ln>
+          </p:spPr>
+          <p:style>
+            <a:lnRef idx="2">
+              <a:schemeClr val="dk1"/>
+            </a:lnRef>
+            <a:fillRef idx="0">
+              <a:schemeClr val="dk1"/>
+            </a:fillRef>
+            <a:effectRef idx="1">
+              <a:schemeClr val="dk1"/>
+            </a:effectRef>
+            <a:fontRef idx="minor">
+              <a:schemeClr val="tx1"/>
+            </a:fontRef>
+          </p:style>
+        </p:cxnSp>
+        <p:cxnSp>
+          <p:nvCxnSpPr>
+            <p:cNvPr id="26627" name="Curved Connector 26626"/>
+            <p:cNvCxnSpPr>
+              <a:stCxn id="55" idx="3"/>
+              <a:endCxn id="36" idx="1"/>
+            </p:cNvCxnSpPr>
+            <p:nvPr/>
+          </p:nvCxnSpPr>
+          <p:spPr>
+            <a:xfrm rot="16200000" flipH="1">
+              <a:off x="1141992" y="3058151"/>
+              <a:ext cx="964306" cy="1112013"/>
+            </a:xfrm>
+            <a:prstGeom prst="curvedConnector3">
+              <a:avLst>
+                <a:gd name="adj1" fmla="val 32003"/>
+              </a:avLst>
+            </a:prstGeom>
+            <a:ln w="38100" cmpd="sng">
+              <a:tailEnd type="arrow"/>
+            </a:ln>
+          </p:spPr>
+          <p:style>
+            <a:lnRef idx="2">
+              <a:schemeClr val="dk1"/>
+            </a:lnRef>
+            <a:fillRef idx="0">
+              <a:schemeClr val="dk1"/>
+            </a:fillRef>
+            <a:effectRef idx="1">
+              <a:schemeClr val="dk1"/>
+            </a:effectRef>
+            <a:fontRef idx="minor">
+              <a:schemeClr val="tx1"/>
+            </a:fontRef>
+          </p:style>
+        </p:cxnSp>
+        <p:cxnSp>
+          <p:nvCxnSpPr>
+            <p:cNvPr id="26631" name="Curved Connector 26630"/>
+            <p:cNvCxnSpPr>
+              <a:stCxn id="36" idx="2"/>
+            </p:cNvCxnSpPr>
+            <p:nvPr/>
+          </p:nvCxnSpPr>
+          <p:spPr>
+            <a:xfrm rot="10800000" flipV="1">
+              <a:off x="1066800" y="4419600"/>
+              <a:ext cx="990600" cy="228600"/>
+            </a:xfrm>
+            <a:prstGeom prst="curvedConnector3">
+              <a:avLst/>
+            </a:prstGeom>
+            <a:ln w="38100" cmpd="sng">
+              <a:tailEnd type="arrow"/>
+            </a:ln>
+          </p:spPr>
+          <p:style>
+            <a:lnRef idx="2">
+              <a:schemeClr val="dk1"/>
+            </a:lnRef>
+            <a:fillRef idx="0">
+              <a:schemeClr val="dk1"/>
+            </a:fillRef>
+            <a:effectRef idx="1">
+              <a:schemeClr val="dk1"/>
+            </a:effectRef>
+            <a:fontRef idx="minor">
+              <a:schemeClr val="tx1"/>
+            </a:fontRef>
+          </p:style>
+        </p:cxnSp>
+      </p:grpSp>
     </p:spTree>
     <p:extLst>
       <p:ext uri="{BB962C8B-B14F-4D97-AF65-F5344CB8AC3E}">
@@ -18676,7 +20775,7 @@
           <a:p>
             <a:fld id="{B629B974-C5F6-7D44-AB85-1B324297721A}" type="datetime1">
               <a:rPr lang="en-US" smtClean="0"/>
-              <a:t>9/15/12</a:t>
+              <a:t>11/9/12</a:t>
             </a:fld>
             <a:endParaRPr lang="en-US" dirty="0"/>
           </a:p>
@@ -18729,37 +20828,6 @@
           </a:p>
         </p:txBody>
       </p:sp>
-      <p:pic>
-        <p:nvPicPr>
-          <p:cNvPr id="27652" name="Picture 4" descr="parallelCompSiamPiece.JPG"/>
-          <p:cNvPicPr>
-            <a:picLocks noChangeAspect="1"/>
-          </p:cNvPicPr>
-          <p:nvPr/>
-        </p:nvPicPr>
-        <p:blipFill>
-          <a:blip r:embed="rId2"/>
-          <a:stretch>
-            <a:fillRect/>
-          </a:stretch>
-        </p:blipFill>
-        <p:spPr bwMode="auto">
-          <a:xfrm>
-            <a:off x="523040" y="2667000"/>
-            <a:ext cx="2406732" cy="2438400"/>
-          </a:xfrm>
-          <a:prstGeom prst="rect">
-            <a:avLst/>
-          </a:prstGeom>
-          <a:noFill/>
-          <a:ln w="9525">
-            <a:noFill/>
-            <a:miter lim="800000"/>
-            <a:headEnd/>
-            <a:tailEnd/>
-          </a:ln>
-        </p:spPr>
-      </p:pic>
       <p:sp>
         <p:nvSpPr>
           <p:cNvPr id="6" name="Rectangle 5"/>
@@ -18768,7 +20836,7 @@
         </p:nvSpPr>
         <p:spPr>
           <a:xfrm>
-            <a:off x="3505200" y="3886200"/>
+            <a:off x="3505200" y="4248090"/>
             <a:ext cx="4343400" cy="381000"/>
           </a:xfrm>
           <a:prstGeom prst="rect">
@@ -18824,7 +20892,7 @@
         </p:nvSpPr>
         <p:spPr>
           <a:xfrm>
-            <a:off x="3505200" y="3200400"/>
+            <a:off x="3505200" y="3562290"/>
             <a:ext cx="4343400" cy="381000"/>
           </a:xfrm>
           <a:prstGeom prst="rect">
@@ -18880,7 +20948,7 @@
         </p:nvSpPr>
         <p:spPr>
           <a:xfrm>
-            <a:off x="3505200" y="2057400"/>
+            <a:off x="3505200" y="2419290"/>
             <a:ext cx="4343400" cy="381000"/>
           </a:xfrm>
           <a:prstGeom prst="rect">
@@ -18936,7 +21004,7 @@
         </p:nvSpPr>
         <p:spPr>
           <a:xfrm>
-            <a:off x="3505200" y="2667000"/>
+            <a:off x="3505200" y="3028890"/>
             <a:ext cx="4343400" cy="381000"/>
           </a:xfrm>
           <a:prstGeom prst="rect">
@@ -18992,7 +21060,7 @@
         </p:nvSpPr>
         <p:spPr>
           <a:xfrm>
-            <a:off x="3657600" y="2819400"/>
+            <a:off x="3657600" y="3181290"/>
             <a:ext cx="76200" cy="76200"/>
           </a:xfrm>
           <a:prstGeom prst="rect">
@@ -19037,7 +21105,7 @@
         </p:nvSpPr>
         <p:spPr>
           <a:xfrm>
-            <a:off x="3657600" y="3352800"/>
+            <a:off x="3657600" y="3714690"/>
             <a:ext cx="76200" cy="76200"/>
           </a:xfrm>
           <a:prstGeom prst="rect">
@@ -19082,7 +21150,7 @@
         </p:nvSpPr>
         <p:spPr>
           <a:xfrm>
-            <a:off x="3733800" y="2286000"/>
+            <a:off x="3733800" y="2647890"/>
             <a:ext cx="76200" cy="76200"/>
           </a:xfrm>
           <a:prstGeom prst="rect">
@@ -19127,7 +21195,7 @@
         </p:nvSpPr>
         <p:spPr>
           <a:xfrm>
-            <a:off x="4038600" y="2286000"/>
+            <a:off x="4038600" y="2647890"/>
             <a:ext cx="76200" cy="76200"/>
           </a:xfrm>
           <a:prstGeom prst="rect">
@@ -19172,7 +21240,7 @@
         </p:nvSpPr>
         <p:spPr>
           <a:xfrm>
-            <a:off x="3962400" y="3352800"/>
+            <a:off x="3962400" y="3714690"/>
             <a:ext cx="76200" cy="76200"/>
           </a:xfrm>
           <a:prstGeom prst="rect">
@@ -19217,7 +21285,7 @@
         </p:nvSpPr>
         <p:spPr>
           <a:xfrm>
-            <a:off x="3657600" y="4038600"/>
+            <a:off x="3657600" y="4400490"/>
             <a:ext cx="76200" cy="76200"/>
           </a:xfrm>
           <a:prstGeom prst="rect">
@@ -19262,7 +21330,7 @@
         </p:nvSpPr>
         <p:spPr>
           <a:xfrm>
-            <a:off x="3886200" y="4038600"/>
+            <a:off x="3886200" y="4400490"/>
             <a:ext cx="76200" cy="76200"/>
           </a:xfrm>
           <a:prstGeom prst="rect">
@@ -19307,7 +21375,7 @@
         </p:nvSpPr>
         <p:spPr>
           <a:xfrm>
-            <a:off x="3886200" y="2819400"/>
+            <a:off x="3886200" y="3181290"/>
             <a:ext cx="76200" cy="76200"/>
           </a:xfrm>
           <a:prstGeom prst="rect">
@@ -19352,7 +21420,7 @@
         </p:nvSpPr>
         <p:spPr>
           <a:xfrm>
-            <a:off x="4114800" y="2819400"/>
+            <a:off x="4114800" y="3181290"/>
             <a:ext cx="76200" cy="76200"/>
           </a:xfrm>
           <a:prstGeom prst="rect">
@@ -19397,7 +21465,7 @@
         </p:nvSpPr>
         <p:spPr>
           <a:xfrm>
-            <a:off x="4724400" y="2819400"/>
+            <a:off x="4724400" y="3181290"/>
             <a:ext cx="76200" cy="76200"/>
           </a:xfrm>
           <a:prstGeom prst="rect">
@@ -19445,7 +21513,7 @@
         </p:nvSpPr>
         <p:spPr>
           <a:xfrm>
-            <a:off x="4953000" y="2819400"/>
+            <a:off x="4953000" y="3181290"/>
             <a:ext cx="76200" cy="76200"/>
           </a:xfrm>
           <a:prstGeom prst="rect">
@@ -19493,7 +21561,7 @@
         </p:nvSpPr>
         <p:spPr>
           <a:xfrm>
-            <a:off x="4953000" y="2286000"/>
+            <a:off x="4953000" y="2647890"/>
             <a:ext cx="76200" cy="76200"/>
           </a:xfrm>
           <a:prstGeom prst="rect">
@@ -19541,7 +21609,7 @@
         </p:nvSpPr>
         <p:spPr>
           <a:xfrm>
-            <a:off x="4343400" y="4038600"/>
+            <a:off x="4343400" y="4400490"/>
             <a:ext cx="76200" cy="76200"/>
           </a:xfrm>
           <a:prstGeom prst="rect">
@@ -19589,7 +21657,7 @@
         </p:nvSpPr>
         <p:spPr>
           <a:xfrm>
-            <a:off x="4419600" y="3352800"/>
+            <a:off x="4419600" y="3714690"/>
             <a:ext cx="76200" cy="76200"/>
           </a:xfrm>
           <a:prstGeom prst="rect">
@@ -19637,7 +21705,7 @@
         </p:nvSpPr>
         <p:spPr>
           <a:xfrm>
-            <a:off x="4495800" y="2286000"/>
+            <a:off x="4495800" y="2647890"/>
             <a:ext cx="76200" cy="76200"/>
           </a:xfrm>
           <a:prstGeom prst="rect">
@@ -19685,7 +21753,7 @@
         </p:nvSpPr>
         <p:spPr>
           <a:xfrm>
-            <a:off x="4648200" y="3352800"/>
+            <a:off x="4648200" y="3714690"/>
             <a:ext cx="76200" cy="76200"/>
           </a:xfrm>
           <a:prstGeom prst="rect">
@@ -19733,7 +21801,7 @@
         </p:nvSpPr>
         <p:spPr>
           <a:xfrm>
-            <a:off x="4876800" y="4038600"/>
+            <a:off x="4876800" y="4400490"/>
             <a:ext cx="76200" cy="76200"/>
           </a:xfrm>
           <a:prstGeom prst="rect">
@@ -19781,7 +21849,7 @@
         </p:nvSpPr>
         <p:spPr>
           <a:xfrm>
-            <a:off x="4495800" y="2819400"/>
+            <a:off x="4495800" y="3181290"/>
             <a:ext cx="76200" cy="76200"/>
           </a:xfrm>
           <a:prstGeom prst="rect">
@@ -19829,7 +21897,7 @@
         </p:nvSpPr>
         <p:spPr>
           <a:xfrm>
-            <a:off x="4572000" y="4038600"/>
+            <a:off x="4572000" y="4400490"/>
             <a:ext cx="76200" cy="76200"/>
           </a:xfrm>
           <a:prstGeom prst="rect">
@@ -19877,7 +21945,7 @@
         </p:nvSpPr>
         <p:spPr>
           <a:xfrm>
-            <a:off x="4876800" y="3352800"/>
+            <a:off x="4876800" y="3714690"/>
             <a:ext cx="76200" cy="76200"/>
           </a:xfrm>
           <a:prstGeom prst="rect">
@@ -19925,7 +21993,7 @@
         </p:nvSpPr>
         <p:spPr>
           <a:xfrm>
-            <a:off x="4724400" y="2286000"/>
+            <a:off x="4724400" y="2647890"/>
             <a:ext cx="76200" cy="76200"/>
           </a:xfrm>
           <a:prstGeom prst="rect">
@@ -20029,7 +22097,7 @@
         </p:nvCxnSpPr>
         <p:spPr>
           <a:xfrm>
-            <a:off x="3657600" y="4800600"/>
+            <a:off x="3657600" y="5162490"/>
             <a:ext cx="4114800" cy="0"/>
           </a:xfrm>
           <a:prstGeom prst="straightConnector1">
@@ -20065,7 +22133,7 @@
         </p:nvSpPr>
         <p:spPr>
           <a:xfrm>
-            <a:off x="5105400" y="4800600"/>
+            <a:off x="5105400" y="5162490"/>
             <a:ext cx="914400" cy="400110"/>
           </a:xfrm>
           <a:prstGeom prst="rect">
@@ -20087,105 +22155,383 @@
           </a:p>
         </p:txBody>
       </p:sp>
-      <p:sp>
-        <p:nvSpPr>
-          <p:cNvPr id="36" name="Oval 35"/>
-          <p:cNvSpPr/>
+      <p:grpSp>
+        <p:nvGrpSpPr>
+          <p:cNvPr id="47" name="Group 46"/>
+          <p:cNvGrpSpPr/>
           <p:nvPr/>
-        </p:nvSpPr>
-        <p:spPr>
-          <a:xfrm>
-            <a:off x="2057400" y="2819400"/>
-            <a:ext cx="838200" cy="838200"/>
-          </a:xfrm>
-          <a:prstGeom prst="ellipse">
-            <a:avLst/>
-          </a:prstGeom>
-          <a:solidFill>
-            <a:schemeClr val="accent1"/>
-          </a:solidFill>
-          <a:ln>
+        </p:nvGrpSpPr>
+        <p:grpSpPr>
+          <a:xfrm>
+            <a:off x="762000" y="2590800"/>
+            <a:ext cx="2133600" cy="2514600"/>
+            <a:chOff x="762000" y="2590800"/>
+            <a:chExt cx="2133600" cy="2514600"/>
+          </a:xfrm>
+        </p:grpSpPr>
+        <p:sp>
+          <p:nvSpPr>
+            <p:cNvPr id="48" name="Oval 47"/>
+            <p:cNvSpPr/>
+            <p:nvPr/>
+          </p:nvSpPr>
+          <p:spPr>
+            <a:xfrm>
+              <a:off x="2057400" y="2743200"/>
+              <a:ext cx="838200" cy="838200"/>
+            </a:xfrm>
+            <a:prstGeom prst="ellipse">
+              <a:avLst/>
+            </a:prstGeom>
+            <a:solidFill>
+              <a:schemeClr val="accent1"/>
+            </a:solidFill>
+            <a:ln>
+              <a:solidFill>
+                <a:schemeClr val="tx1"/>
+              </a:solidFill>
+            </a:ln>
+          </p:spPr>
+          <p:style>
+            <a:lnRef idx="1">
+              <a:schemeClr val="accent1"/>
+            </a:lnRef>
+            <a:fillRef idx="3">
+              <a:schemeClr val="accent1"/>
+            </a:fillRef>
+            <a:effectRef idx="2">
+              <a:schemeClr val="accent1"/>
+            </a:effectRef>
+            <a:fontRef idx="minor">
+              <a:schemeClr val="lt1"/>
+            </a:fontRef>
+          </p:style>
+          <p:txBody>
+            <a:bodyPr rtlCol="0" anchor="ctr"/>
+            <a:lstStyle/>
+            <a:p>
+              <a:pPr algn="ctr"/>
+              <a:r>
+                <a:rPr lang="en-US" dirty="0" smtClean="0"/>
+                <a:t>B</a:t>
+              </a:r>
+              <a:endParaRPr lang="en-US" dirty="0"/>
+            </a:p>
+          </p:txBody>
+        </p:sp>
+        <p:sp>
+          <p:nvSpPr>
+            <p:cNvPr id="49" name="Oval 48"/>
+            <p:cNvSpPr/>
+            <p:nvPr/>
+          </p:nvSpPr>
+          <p:spPr>
+            <a:xfrm>
+              <a:off x="2057400" y="3962400"/>
+              <a:ext cx="838200" cy="914400"/>
+            </a:xfrm>
+            <a:prstGeom prst="ellipse">
+              <a:avLst/>
+            </a:prstGeom>
+            <a:solidFill>
+              <a:schemeClr val="accent3"/>
+            </a:solidFill>
+            <a:ln>
+              <a:solidFill>
+                <a:schemeClr val="tx1"/>
+              </a:solidFill>
+            </a:ln>
+          </p:spPr>
+          <p:style>
+            <a:lnRef idx="1">
+              <a:schemeClr val="accent1"/>
+            </a:lnRef>
+            <a:fillRef idx="3">
+              <a:schemeClr val="accent1"/>
+            </a:fillRef>
+            <a:effectRef idx="2">
+              <a:schemeClr val="accent1"/>
+            </a:effectRef>
+            <a:fontRef idx="minor">
+              <a:schemeClr val="lt1"/>
+            </a:fontRef>
+          </p:style>
+          <p:txBody>
+            <a:bodyPr rtlCol="0" anchor="ctr"/>
+            <a:lstStyle/>
+            <a:p>
+              <a:pPr algn="ctr"/>
+              <a:r>
+                <a:rPr lang="en-US" dirty="0"/>
+                <a:t>C</a:t>
+              </a:r>
+            </a:p>
+          </p:txBody>
+        </p:sp>
+        <p:sp>
+          <p:nvSpPr>
+            <p:cNvPr id="50" name="Oval 49"/>
+            <p:cNvSpPr/>
+            <p:nvPr/>
+          </p:nvSpPr>
+          <p:spPr>
+            <a:xfrm>
+              <a:off x="762000" y="2590800"/>
+              <a:ext cx="685800" cy="2514600"/>
+            </a:xfrm>
+            <a:prstGeom prst="ellipse">
+              <a:avLst/>
+            </a:prstGeom>
+            <a:solidFill>
+              <a:srgbClr val="F8CFC8"/>
+            </a:solidFill>
+          </p:spPr>
+          <p:style>
+            <a:lnRef idx="2">
+              <a:schemeClr val="dk1"/>
+            </a:lnRef>
+            <a:fillRef idx="1">
+              <a:schemeClr val="lt1"/>
+            </a:fillRef>
+            <a:effectRef idx="0">
+              <a:schemeClr val="dk1"/>
+            </a:effectRef>
+            <a:fontRef idx="minor">
+              <a:schemeClr val="dk1"/>
+            </a:fontRef>
+          </p:style>
+          <p:txBody>
+            <a:bodyPr rtlCol="0" anchor="ctr"/>
+            <a:lstStyle/>
+            <a:p>
+              <a:pPr algn="ctr"/>
+              <a:endParaRPr lang="en-US">
+                <a:solidFill>
+                  <a:srgbClr val="FE8637"/>
+                </a:solidFill>
+              </a:endParaRPr>
+            </a:p>
+          </p:txBody>
+        </p:sp>
+        <p:sp>
+          <p:nvSpPr>
+            <p:cNvPr id="51" name="Oval 50"/>
+            <p:cNvSpPr/>
+            <p:nvPr/>
+          </p:nvSpPr>
+          <p:spPr>
+            <a:xfrm>
+              <a:off x="1066800" y="3124200"/>
+              <a:ext cx="9144" cy="9144"/>
+            </a:xfrm>
+            <a:prstGeom prst="ellipse">
+              <a:avLst/>
+            </a:prstGeom>
             <a:solidFill>
               <a:schemeClr val="tx1"/>
             </a:solidFill>
-          </a:ln>
-        </p:spPr>
-        <p:style>
-          <a:lnRef idx="1">
-            <a:schemeClr val="accent1"/>
-          </a:lnRef>
-          <a:fillRef idx="3">
-            <a:schemeClr val="accent1"/>
-          </a:fillRef>
-          <a:effectRef idx="2">
-            <a:schemeClr val="accent1"/>
-          </a:effectRef>
-          <a:fontRef idx="minor">
-            <a:schemeClr val="lt1"/>
-          </a:fontRef>
-        </p:style>
-        <p:txBody>
-          <a:bodyPr rtlCol="0" anchor="ctr"/>
-          <a:lstStyle/>
-          <a:p>
-            <a:pPr algn="ctr"/>
-            <a:r>
-              <a:rPr lang="en-US" dirty="0" smtClean="0"/>
-              <a:t>B</a:t>
-            </a:r>
-            <a:endParaRPr lang="en-US" dirty="0"/>
-          </a:p>
-        </p:txBody>
-      </p:sp>
-      <p:sp>
-        <p:nvSpPr>
-          <p:cNvPr id="37" name="Oval 36"/>
-          <p:cNvSpPr/>
-          <p:nvPr/>
-        </p:nvSpPr>
-        <p:spPr>
-          <a:xfrm>
-            <a:off x="2057400" y="4114800"/>
-            <a:ext cx="838200" cy="838200"/>
-          </a:xfrm>
-          <a:prstGeom prst="ellipse">
-            <a:avLst/>
-          </a:prstGeom>
-          <a:solidFill>
-            <a:schemeClr val="accent3"/>
-          </a:solidFill>
-          <a:ln>
-            <a:solidFill>
+          </p:spPr>
+          <p:style>
+            <a:lnRef idx="2">
+              <a:schemeClr val="dk1"/>
+            </a:lnRef>
+            <a:fillRef idx="1">
+              <a:schemeClr val="lt1"/>
+            </a:fillRef>
+            <a:effectRef idx="0">
+              <a:schemeClr val="dk1"/>
+            </a:effectRef>
+            <a:fontRef idx="minor">
+              <a:schemeClr val="dk1"/>
+            </a:fontRef>
+          </p:style>
+          <p:txBody>
+            <a:bodyPr rtlCol="0" anchor="ctr"/>
+            <a:lstStyle/>
+            <a:p>
+              <a:pPr algn="ctr"/>
+              <a:endParaRPr lang="en-US"/>
+            </a:p>
+          </p:txBody>
+        </p:sp>
+        <p:cxnSp>
+          <p:nvCxnSpPr>
+            <p:cNvPr id="52" name="Straight Connector 51"/>
+            <p:cNvCxnSpPr>
+              <a:stCxn id="50" idx="0"/>
+            </p:cNvCxnSpPr>
+            <p:nvPr/>
+          </p:nvCxnSpPr>
+          <p:spPr>
+            <a:xfrm flipH="1">
+              <a:off x="1066800" y="2590800"/>
+              <a:ext cx="38100" cy="533400"/>
+            </a:xfrm>
+            <a:prstGeom prst="line">
+              <a:avLst/>
+            </a:prstGeom>
+            <a:ln w="38100" cmpd="sng"/>
+          </p:spPr>
+          <p:style>
+            <a:lnRef idx="2">
+              <a:schemeClr val="dk1"/>
+            </a:lnRef>
+            <a:fillRef idx="0">
+              <a:schemeClr val="dk1"/>
+            </a:fillRef>
+            <a:effectRef idx="1">
+              <a:schemeClr val="dk1"/>
+            </a:effectRef>
+            <a:fontRef idx="minor">
               <a:schemeClr val="tx1"/>
-            </a:solidFill>
-          </a:ln>
-        </p:spPr>
-        <p:style>
-          <a:lnRef idx="1">
-            <a:schemeClr val="accent1"/>
-          </a:lnRef>
-          <a:fillRef idx="3">
-            <a:schemeClr val="accent1"/>
-          </a:fillRef>
-          <a:effectRef idx="2">
-            <a:schemeClr val="accent1"/>
-          </a:effectRef>
-          <a:fontRef idx="minor">
-            <a:schemeClr val="lt1"/>
-          </a:fontRef>
-        </p:style>
-        <p:txBody>
-          <a:bodyPr rtlCol="0" anchor="ctr"/>
-          <a:lstStyle/>
-          <a:p>
-            <a:pPr algn="ctr"/>
-            <a:r>
-              <a:rPr lang="en-US" dirty="0"/>
-              <a:t>C</a:t>
-            </a:r>
-          </a:p>
-        </p:txBody>
-      </p:sp>
+            </a:fontRef>
+          </p:style>
+        </p:cxnSp>
+        <p:cxnSp>
+          <p:nvCxnSpPr>
+            <p:cNvPr id="53" name="Curved Connector 52"/>
+            <p:cNvCxnSpPr>
+              <a:stCxn id="51" idx="3"/>
+              <a:endCxn id="48" idx="2"/>
+            </p:cNvCxnSpPr>
+            <p:nvPr/>
+          </p:nvCxnSpPr>
+          <p:spPr>
+            <a:xfrm rot="16200000" flipH="1">
+              <a:off x="1547622" y="2652521"/>
+              <a:ext cx="30295" cy="989261"/>
+            </a:xfrm>
+            <a:prstGeom prst="curvedConnector2">
+              <a:avLst/>
+            </a:prstGeom>
+            <a:ln w="38100" cmpd="sng">
+              <a:tailEnd type="arrow"/>
+            </a:ln>
+          </p:spPr>
+          <p:style>
+            <a:lnRef idx="2">
+              <a:schemeClr val="dk1"/>
+            </a:lnRef>
+            <a:fillRef idx="0">
+              <a:schemeClr val="dk1"/>
+            </a:fillRef>
+            <a:effectRef idx="1">
+              <a:schemeClr val="dk1"/>
+            </a:effectRef>
+            <a:fontRef idx="minor">
+              <a:schemeClr val="tx1"/>
+            </a:fontRef>
+          </p:style>
+        </p:cxnSp>
+        <p:cxnSp>
+          <p:nvCxnSpPr>
+            <p:cNvPr id="54" name="Curved Connector 53"/>
+            <p:cNvCxnSpPr>
+              <a:stCxn id="48" idx="3"/>
+            </p:cNvCxnSpPr>
+            <p:nvPr/>
+          </p:nvCxnSpPr>
+          <p:spPr>
+            <a:xfrm rot="5400000">
+              <a:off x="1143000" y="3382448"/>
+              <a:ext cx="960952" cy="1113352"/>
+            </a:xfrm>
+            <a:prstGeom prst="curvedConnector2">
+              <a:avLst/>
+            </a:prstGeom>
+            <a:ln w="38100" cmpd="sng">
+              <a:tailEnd type="arrow"/>
+            </a:ln>
+          </p:spPr>
+          <p:style>
+            <a:lnRef idx="2">
+              <a:schemeClr val="dk1"/>
+            </a:lnRef>
+            <a:fillRef idx="0">
+              <a:schemeClr val="dk1"/>
+            </a:fillRef>
+            <a:effectRef idx="1">
+              <a:schemeClr val="dk1"/>
+            </a:effectRef>
+            <a:fontRef idx="minor">
+              <a:schemeClr val="tx1"/>
+            </a:fontRef>
+          </p:style>
+        </p:cxnSp>
+        <p:cxnSp>
+          <p:nvCxnSpPr>
+            <p:cNvPr id="55" name="Curved Connector 54"/>
+            <p:cNvCxnSpPr>
+              <a:stCxn id="51" idx="3"/>
+              <a:endCxn id="49" idx="1"/>
+            </p:cNvCxnSpPr>
+            <p:nvPr/>
+          </p:nvCxnSpPr>
+          <p:spPr>
+            <a:xfrm rot="16200000" flipH="1">
+              <a:off x="1141992" y="3058151"/>
+              <a:ext cx="964306" cy="1112013"/>
+            </a:xfrm>
+            <a:prstGeom prst="curvedConnector3">
+              <a:avLst>
+                <a:gd name="adj1" fmla="val 32003"/>
+              </a:avLst>
+            </a:prstGeom>
+            <a:ln w="38100" cmpd="sng">
+              <a:tailEnd type="arrow"/>
+            </a:ln>
+          </p:spPr>
+          <p:style>
+            <a:lnRef idx="2">
+              <a:schemeClr val="dk1"/>
+            </a:lnRef>
+            <a:fillRef idx="0">
+              <a:schemeClr val="dk1"/>
+            </a:fillRef>
+            <a:effectRef idx="1">
+              <a:schemeClr val="dk1"/>
+            </a:effectRef>
+            <a:fontRef idx="minor">
+              <a:schemeClr val="tx1"/>
+            </a:fontRef>
+          </p:style>
+        </p:cxnSp>
+        <p:cxnSp>
+          <p:nvCxnSpPr>
+            <p:cNvPr id="56" name="Curved Connector 55"/>
+            <p:cNvCxnSpPr>
+              <a:stCxn id="49" idx="2"/>
+            </p:cNvCxnSpPr>
+            <p:nvPr/>
+          </p:nvCxnSpPr>
+          <p:spPr>
+            <a:xfrm rot="10800000" flipV="1">
+              <a:off x="1066800" y="4419600"/>
+              <a:ext cx="990600" cy="228600"/>
+            </a:xfrm>
+            <a:prstGeom prst="curvedConnector3">
+              <a:avLst/>
+            </a:prstGeom>
+            <a:ln w="38100" cmpd="sng">
+              <a:tailEnd type="arrow"/>
+            </a:ln>
+          </p:spPr>
+          <p:style>
+            <a:lnRef idx="2">
+              <a:schemeClr val="dk1"/>
+            </a:lnRef>
+            <a:fillRef idx="0">
+              <a:schemeClr val="dk1"/>
+            </a:fillRef>
+            <a:effectRef idx="1">
+              <a:schemeClr val="dk1"/>
+            </a:effectRef>
+            <a:fontRef idx="minor">
+              <a:schemeClr val="tx1"/>
+            </a:fontRef>
+          </p:style>
+        </p:cxnSp>
+      </p:grpSp>
     </p:spTree>
     <p:extLst>
       <p:ext uri="{BB962C8B-B14F-4D97-AF65-F5344CB8AC3E}">

</xml_diff>